<commit_message>
Servicio lambda y glue
</commit_message>
<xml_diff>
--- a/Entregables/Arquitecura Honey Pot.pptx
+++ b/Entregables/Arquitecura Honey Pot.pptx
@@ -115,7 +115,7 @@
 <file path=ppt/revisionInfo.xml><?xml version="1.0" encoding="utf-8"?>
 <p1510:revInfo xmlns:a="http://schemas.openxmlformats.org/drawingml/2006/main" xmlns:r="http://schemas.openxmlformats.org/officeDocument/2006/relationships" xmlns:p1510="http://schemas.microsoft.com/office/powerpoint/2015/10/main">
   <p1510:revLst>
-    <p1510:client id="{1A2818A9-C095-4D0E-BAAF-1EF1624DDCCB}" v="125" dt="2024-06-17T16:08:12.067"/>
+    <p1510:client id="{1A2818A9-C095-4D0E-BAAF-1EF1624DDCCB}" v="185" dt="2024-07-05T15:49:41.366"/>
   </p1510:revLst>
 </p1510:revInfo>
 </file>
@@ -124,13 +124,13 @@
 <pc:chgInfo xmlns:a="http://schemas.openxmlformats.org/drawingml/2006/main" xmlns:r="http://schemas.openxmlformats.org/officeDocument/2006/relationships" xmlns:ac="http://schemas.microsoft.com/office/drawing/2013/main/command" xmlns:pc="http://schemas.microsoft.com/office/powerpoint/2013/main/command">
   <pc:docChgLst>
     <pc:chgData name="RIVAS LUCANO, GUSTAVO" userId="5361705b-415d-4939-a7ef-76f2f9379335" providerId="ADAL" clId="{1A2818A9-C095-4D0E-BAAF-1EF1624DDCCB}"/>
-    <pc:docChg chg="custSel modSld">
-      <pc:chgData name="RIVAS LUCANO, GUSTAVO" userId="5361705b-415d-4939-a7ef-76f2f9379335" providerId="ADAL" clId="{1A2818A9-C095-4D0E-BAAF-1EF1624DDCCB}" dt="2024-06-17T16:08:20.344" v="222" actId="20577"/>
+    <pc:docChg chg="undo redo custSel modSld">
+      <pc:chgData name="RIVAS LUCANO, GUSTAVO" userId="5361705b-415d-4939-a7ef-76f2f9379335" providerId="ADAL" clId="{1A2818A9-C095-4D0E-BAAF-1EF1624DDCCB}" dt="2024-07-05T15:49:41.363" v="443" actId="1076"/>
       <pc:docMkLst>
         <pc:docMk/>
       </pc:docMkLst>
       <pc:sldChg chg="addSp delSp modSp mod">
-        <pc:chgData name="RIVAS LUCANO, GUSTAVO" userId="5361705b-415d-4939-a7ef-76f2f9379335" providerId="ADAL" clId="{1A2818A9-C095-4D0E-BAAF-1EF1624DDCCB}" dt="2024-06-17T16:08:20.344" v="222" actId="20577"/>
+        <pc:chgData name="RIVAS LUCANO, GUSTAVO" userId="5361705b-415d-4939-a7ef-76f2f9379335" providerId="ADAL" clId="{1A2818A9-C095-4D0E-BAAF-1EF1624DDCCB}" dt="2024-07-05T15:49:41.363" v="443" actId="1076"/>
         <pc:sldMkLst>
           <pc:docMk/>
           <pc:sldMk cId="2593531163" sldId="256"/>
@@ -152,11 +152,19 @@
           </ac:spMkLst>
         </pc:spChg>
         <pc:spChg chg="mod">
-          <ac:chgData name="RIVAS LUCANO, GUSTAVO" userId="5361705b-415d-4939-a7ef-76f2f9379335" providerId="ADAL" clId="{1A2818A9-C095-4D0E-BAAF-1EF1624DDCCB}" dt="2024-06-12T00:41:53.416" v="35" actId="14100"/>
+          <ac:chgData name="RIVAS LUCANO, GUSTAVO" userId="5361705b-415d-4939-a7ef-76f2f9379335" providerId="ADAL" clId="{1A2818A9-C095-4D0E-BAAF-1EF1624DDCCB}" dt="2024-07-05T15:46:54.735" v="406" actId="14100"/>
           <ac:spMkLst>
             <pc:docMk/>
             <pc:sldMk cId="2593531163" sldId="256"/>
             <ac:spMk id="7" creationId="{0E383D39-1F63-E3AF-256C-ED755C69E3AD}"/>
+          </ac:spMkLst>
+        </pc:spChg>
+        <pc:spChg chg="mod">
+          <ac:chgData name="RIVAS LUCANO, GUSTAVO" userId="5361705b-415d-4939-a7ef-76f2f9379335" providerId="ADAL" clId="{1A2818A9-C095-4D0E-BAAF-1EF1624DDCCB}" dt="2024-07-05T15:47:48.733" v="423" actId="1038"/>
+          <ac:spMkLst>
+            <pc:docMk/>
+            <pc:sldMk cId="2593531163" sldId="256"/>
+            <ac:spMk id="9" creationId="{1B976D0C-8CED-1040-AF99-2E4B5C005875}"/>
           </ac:spMkLst>
         </pc:spChg>
         <pc:spChg chg="mod">
@@ -165,6 +173,14 @@
             <pc:docMk/>
             <pc:sldMk cId="2593531163" sldId="256"/>
             <ac:spMk id="12" creationId="{29576317-4BE5-03BA-B2DC-20855EC8B7B0}"/>
+          </ac:spMkLst>
+        </pc:spChg>
+        <pc:spChg chg="add del mod">
+          <ac:chgData name="RIVAS LUCANO, GUSTAVO" userId="5361705b-415d-4939-a7ef-76f2f9379335" providerId="ADAL" clId="{1A2818A9-C095-4D0E-BAAF-1EF1624DDCCB}" dt="2024-07-05T15:44:37.276" v="355" actId="478"/>
+          <ac:spMkLst>
+            <pc:docMk/>
+            <pc:sldMk cId="2593531163" sldId="256"/>
+            <ac:spMk id="16" creationId="{C0E92397-A5EA-E1FB-2AD6-C8E367426BC7}"/>
           </ac:spMkLst>
         </pc:spChg>
         <pc:spChg chg="mod">
@@ -184,7 +200,7 @@
           </ac:spMkLst>
         </pc:spChg>
         <pc:spChg chg="mod">
-          <ac:chgData name="RIVAS LUCANO, GUSTAVO" userId="5361705b-415d-4939-a7ef-76f2f9379335" providerId="ADAL" clId="{1A2818A9-C095-4D0E-BAAF-1EF1624DDCCB}" dt="2024-06-12T00:42:09.196" v="39" actId="1076"/>
+          <ac:chgData name="RIVAS LUCANO, GUSTAVO" userId="5361705b-415d-4939-a7ef-76f2f9379335" providerId="ADAL" clId="{1A2818A9-C095-4D0E-BAAF-1EF1624DDCCB}" dt="2024-07-05T15:45:22.775" v="358" actId="1076"/>
           <ac:spMkLst>
             <pc:docMk/>
             <pc:sldMk cId="2593531163" sldId="256"/>
@@ -200,6 +216,14 @@
           </ac:spMkLst>
         </pc:spChg>
         <pc:spChg chg="mod">
+          <ac:chgData name="RIVAS LUCANO, GUSTAVO" userId="5361705b-415d-4939-a7ef-76f2f9379335" providerId="ADAL" clId="{1A2818A9-C095-4D0E-BAAF-1EF1624DDCCB}" dt="2024-07-05T15:44:34.338" v="353" actId="368"/>
+          <ac:spMkLst>
+            <pc:docMk/>
+            <pc:sldMk cId="2593531163" sldId="256"/>
+            <ac:spMk id="33" creationId="{FAAA9BBF-2F32-8748-67D8-DA7F041AA909}"/>
+          </ac:spMkLst>
+        </pc:spChg>
+        <pc:spChg chg="mod">
           <ac:chgData name="RIVAS LUCANO, GUSTAVO" userId="5361705b-415d-4939-a7ef-76f2f9379335" providerId="ADAL" clId="{1A2818A9-C095-4D0E-BAAF-1EF1624DDCCB}" dt="2024-06-12T00:38:48.352" v="26" actId="1036"/>
           <ac:spMkLst>
             <pc:docMk/>
@@ -207,8 +231,8 @@
             <ac:spMk id="37" creationId="{00442AE3-D56B-F608-F662-CC11E3A144C1}"/>
           </ac:spMkLst>
         </pc:spChg>
-        <pc:spChg chg="add mod">
-          <ac:chgData name="RIVAS LUCANO, GUSTAVO" userId="5361705b-415d-4939-a7ef-76f2f9379335" providerId="ADAL" clId="{1A2818A9-C095-4D0E-BAAF-1EF1624DDCCB}" dt="2024-06-17T15:57:43.187" v="118" actId="20577"/>
+        <pc:spChg chg="add del mod">
+          <ac:chgData name="RIVAS LUCANO, GUSTAVO" userId="5361705b-415d-4939-a7ef-76f2f9379335" providerId="ADAL" clId="{1A2818A9-C095-4D0E-BAAF-1EF1624DDCCB}" dt="2024-07-05T15:48:40.427" v="432" actId="478"/>
           <ac:spMkLst>
             <pc:docMk/>
             <pc:sldMk cId="2593531163" sldId="256"/>
@@ -223,8 +247,8 @@
             <ac:spMk id="56" creationId="{D2442151-A9D9-2CC7-3002-B5E1FB88FC7C}"/>
           </ac:spMkLst>
         </pc:spChg>
-        <pc:spChg chg="add mod">
-          <ac:chgData name="RIVAS LUCANO, GUSTAVO" userId="5361705b-415d-4939-a7ef-76f2f9379335" providerId="ADAL" clId="{1A2818A9-C095-4D0E-BAAF-1EF1624DDCCB}" dt="2024-06-17T16:08:04.404" v="213"/>
+        <pc:spChg chg="add del mod">
+          <ac:chgData name="RIVAS LUCANO, GUSTAVO" userId="5361705b-415d-4939-a7ef-76f2f9379335" providerId="ADAL" clId="{1A2818A9-C095-4D0E-BAAF-1EF1624DDCCB}" dt="2024-07-05T15:41:59.578" v="226" actId="478"/>
           <ac:spMkLst>
             <pc:docMk/>
             <pc:sldMk cId="2593531163" sldId="256"/>
@@ -232,11 +256,19 @@
           </ac:spMkLst>
         </pc:spChg>
         <pc:spChg chg="add mod">
-          <ac:chgData name="RIVAS LUCANO, GUSTAVO" userId="5361705b-415d-4939-a7ef-76f2f9379335" providerId="ADAL" clId="{1A2818A9-C095-4D0E-BAAF-1EF1624DDCCB}" dt="2024-06-17T16:08:20.344" v="222" actId="20577"/>
+          <ac:chgData name="RIVAS LUCANO, GUSTAVO" userId="5361705b-415d-4939-a7ef-76f2f9379335" providerId="ADAL" clId="{1A2818A9-C095-4D0E-BAAF-1EF1624DDCCB}" dt="2024-07-05T15:48:14.001" v="428" actId="1076"/>
           <ac:spMkLst>
             <pc:docMk/>
             <pc:sldMk cId="2593531163" sldId="256"/>
             <ac:spMk id="63" creationId="{33049AE0-0CDF-0569-8F62-BE3421A974E8}"/>
+          </ac:spMkLst>
+        </pc:spChg>
+        <pc:spChg chg="mod">
+          <ac:chgData name="RIVAS LUCANO, GUSTAVO" userId="5361705b-415d-4939-a7ef-76f2f9379335" providerId="ADAL" clId="{1A2818A9-C095-4D0E-BAAF-1EF1624DDCCB}" dt="2024-07-05T15:46:44.995" v="395" actId="1038"/>
+          <ac:spMkLst>
+            <pc:docMk/>
+            <pc:sldMk cId="2593531163" sldId="256"/>
+            <ac:spMk id="68" creationId="{D2CC7AFC-653F-F4FD-2C51-5EA1DAF94B86}"/>
           </ac:spMkLst>
         </pc:spChg>
         <pc:grpChg chg="mod topLvl">
@@ -248,7 +280,7 @@
           </ac:grpSpMkLst>
         </pc:grpChg>
         <pc:grpChg chg="mod">
-          <ac:chgData name="RIVAS LUCANO, GUSTAVO" userId="5361705b-415d-4939-a7ef-76f2f9379335" providerId="ADAL" clId="{1A2818A9-C095-4D0E-BAAF-1EF1624DDCCB}" dt="2024-06-12T00:44:08.840" v="47" actId="1076"/>
+          <ac:chgData name="RIVAS LUCANO, GUSTAVO" userId="5361705b-415d-4939-a7ef-76f2f9379335" providerId="ADAL" clId="{1A2818A9-C095-4D0E-BAAF-1EF1624DDCCB}" dt="2024-07-05T15:44:33.220" v="348" actId="1076"/>
           <ac:grpSpMkLst>
             <pc:docMk/>
             <pc:sldMk cId="2593531163" sldId="256"/>
@@ -256,15 +288,39 @@
           </ac:grpSpMkLst>
         </pc:grpChg>
         <pc:grpChg chg="mod">
-          <ac:chgData name="RIVAS LUCANO, GUSTAVO" userId="5361705b-415d-4939-a7ef-76f2f9379335" providerId="ADAL" clId="{1A2818A9-C095-4D0E-BAAF-1EF1624DDCCB}" dt="2024-06-17T16:00:07.130" v="127" actId="14100"/>
+          <ac:chgData name="RIVAS LUCANO, GUSTAVO" userId="5361705b-415d-4939-a7ef-76f2f9379335" providerId="ADAL" clId="{1A2818A9-C095-4D0E-BAAF-1EF1624DDCCB}" dt="2024-07-05T15:47:48.733" v="423" actId="1038"/>
+          <ac:grpSpMkLst>
+            <pc:docMk/>
+            <pc:sldMk cId="2593531163" sldId="256"/>
+            <ac:grpSpMk id="19" creationId="{FBD7FC6C-8573-5896-536A-00BD78B05519}"/>
+          </ac:grpSpMkLst>
+        </pc:grpChg>
+        <pc:grpChg chg="mod">
+          <ac:chgData name="RIVAS LUCANO, GUSTAVO" userId="5361705b-415d-4939-a7ef-76f2f9379335" providerId="ADAL" clId="{1A2818A9-C095-4D0E-BAAF-1EF1624DDCCB}" dt="2024-07-05T15:45:31.710" v="360" actId="14100"/>
+          <ac:grpSpMkLst>
+            <pc:docMk/>
+            <pc:sldMk cId="2593531163" sldId="256"/>
+            <ac:grpSpMk id="21" creationId="{E9A802A7-D563-39AC-0717-9A5FD319AC01}"/>
+          </ac:grpSpMkLst>
+        </pc:grpChg>
+        <pc:grpChg chg="add del mod">
+          <ac:chgData name="RIVAS LUCANO, GUSTAVO" userId="5361705b-415d-4939-a7ef-76f2f9379335" providerId="ADAL" clId="{1A2818A9-C095-4D0E-BAAF-1EF1624DDCCB}" dt="2024-07-05T15:44:35.274" v="354" actId="478"/>
+          <ac:grpSpMkLst>
+            <pc:docMk/>
+            <pc:sldMk cId="2593531163" sldId="256"/>
+            <ac:grpSpMk id="24" creationId="{F49F96D1-0116-DE99-7901-6A639EE97D9C}"/>
+          </ac:grpSpMkLst>
+        </pc:grpChg>
+        <pc:grpChg chg="mod">
+          <ac:chgData name="RIVAS LUCANO, GUSTAVO" userId="5361705b-415d-4939-a7ef-76f2f9379335" providerId="ADAL" clId="{1A2818A9-C095-4D0E-BAAF-1EF1624DDCCB}" dt="2024-07-05T15:42:03.425" v="227" actId="14100"/>
           <ac:grpSpMkLst>
             <pc:docMk/>
             <pc:sldMk cId="2593531163" sldId="256"/>
             <ac:grpSpMk id="25" creationId="{AD7068B9-8358-7F70-F1BD-F710CF5D4564}"/>
           </ac:grpSpMkLst>
         </pc:grpChg>
-        <pc:grpChg chg="mod">
-          <ac:chgData name="RIVAS LUCANO, GUSTAVO" userId="5361705b-415d-4939-a7ef-76f2f9379335" providerId="ADAL" clId="{1A2818A9-C095-4D0E-BAAF-1EF1624DDCCB}" dt="2024-06-12T00:44:51.683" v="63" actId="1035"/>
+        <pc:grpChg chg="del mod">
+          <ac:chgData name="RIVAS LUCANO, GUSTAVO" userId="5361705b-415d-4939-a7ef-76f2f9379335" providerId="ADAL" clId="{1A2818A9-C095-4D0E-BAAF-1EF1624DDCCB}" dt="2024-07-05T15:42:09.517" v="228" actId="478"/>
           <ac:grpSpMkLst>
             <pc:docMk/>
             <pc:sldMk cId="2593531163" sldId="256"/>
@@ -272,7 +328,7 @@
           </ac:grpSpMkLst>
         </pc:grpChg>
         <pc:grpChg chg="mod">
-          <ac:chgData name="RIVAS LUCANO, GUSTAVO" userId="5361705b-415d-4939-a7ef-76f2f9379335" providerId="ADAL" clId="{1A2818A9-C095-4D0E-BAAF-1EF1624DDCCB}" dt="2024-06-12T00:42:09.196" v="39" actId="1076"/>
+          <ac:chgData name="RIVAS LUCANO, GUSTAVO" userId="5361705b-415d-4939-a7ef-76f2f9379335" providerId="ADAL" clId="{1A2818A9-C095-4D0E-BAAF-1EF1624DDCCB}" dt="2024-07-05T15:45:22.775" v="358" actId="1076"/>
           <ac:grpSpMkLst>
             <pc:docMk/>
             <pc:sldMk cId="2593531163" sldId="256"/>
@@ -311,8 +367,16 @@
             <ac:grpSpMk id="49" creationId="{6D7E565A-71BB-BD34-C2D4-12BE1EBE1345}"/>
           </ac:grpSpMkLst>
         </pc:grpChg>
-        <pc:picChg chg="add mod">
-          <ac:chgData name="RIVAS LUCANO, GUSTAVO" userId="5361705b-415d-4939-a7ef-76f2f9379335" providerId="ADAL" clId="{1A2818A9-C095-4D0E-BAAF-1EF1624DDCCB}" dt="2024-06-17T15:59:18.166" v="124" actId="1038"/>
+        <pc:grpChg chg="add mod">
+          <ac:chgData name="RIVAS LUCANO, GUSTAVO" userId="5361705b-415d-4939-a7ef-76f2f9379335" providerId="ADAL" clId="{1A2818A9-C095-4D0E-BAAF-1EF1624DDCCB}" dt="2024-07-05T15:46:17.880" v="367" actId="1076"/>
+          <ac:grpSpMkLst>
+            <pc:docMk/>
+            <pc:sldMk cId="2593531163" sldId="256"/>
+            <ac:grpSpMk id="66" creationId="{F5E28F08-3AFA-3AA0-595C-B7B3F6C97BF8}"/>
+          </ac:grpSpMkLst>
+        </pc:grpChg>
+        <pc:picChg chg="add del mod">
+          <ac:chgData name="RIVAS LUCANO, GUSTAVO" userId="5361705b-415d-4939-a7ef-76f2f9379335" providerId="ADAL" clId="{1A2818A9-C095-4D0E-BAAF-1EF1624DDCCB}" dt="2024-07-05T15:41:48.172" v="224" actId="478"/>
           <ac:picMkLst>
             <pc:docMk/>
             <pc:sldMk cId="2593531163" sldId="256"/>
@@ -325,6 +389,14 @@
             <pc:docMk/>
             <pc:sldMk cId="2593531163" sldId="256"/>
             <ac:picMk id="4" creationId="{D8BF4734-063C-8A29-9FDD-F9B4322B9E84}"/>
+          </ac:picMkLst>
+        </pc:picChg>
+        <pc:picChg chg="mod">
+          <ac:chgData name="RIVAS LUCANO, GUSTAVO" userId="5361705b-415d-4939-a7ef-76f2f9379335" providerId="ADAL" clId="{1A2818A9-C095-4D0E-BAAF-1EF1624DDCCB}" dt="2024-07-05T15:47:48.733" v="423" actId="1038"/>
+          <ac:picMkLst>
+            <pc:docMk/>
+            <pc:sldMk cId="2593531163" sldId="256"/>
+            <ac:picMk id="8" creationId="{1324C186-F7C0-C862-7068-DA0AC7FE121C}"/>
           </ac:picMkLst>
         </pc:picChg>
         <pc:picChg chg="mod">
@@ -344,11 +416,19 @@
           </ac:picMkLst>
         </pc:picChg>
         <pc:picChg chg="mod">
-          <ac:chgData name="RIVAS LUCANO, GUSTAVO" userId="5361705b-415d-4939-a7ef-76f2f9379335" providerId="ADAL" clId="{1A2818A9-C095-4D0E-BAAF-1EF1624DDCCB}" dt="2024-06-12T00:42:09.196" v="39" actId="1076"/>
+          <ac:chgData name="RIVAS LUCANO, GUSTAVO" userId="5361705b-415d-4939-a7ef-76f2f9379335" providerId="ADAL" clId="{1A2818A9-C095-4D0E-BAAF-1EF1624DDCCB}" dt="2024-07-05T15:45:22.775" v="358" actId="1076"/>
           <ac:picMkLst>
             <pc:docMk/>
             <pc:sldMk cId="2593531163" sldId="256"/>
             <ac:picMk id="29" creationId="{BD0F9D20-AC25-2618-D8BD-6F636CAD473C}"/>
+          </ac:picMkLst>
+        </pc:picChg>
+        <pc:picChg chg="mod">
+          <ac:chgData name="RIVAS LUCANO, GUSTAVO" userId="5361705b-415d-4939-a7ef-76f2f9379335" providerId="ADAL" clId="{1A2818A9-C095-4D0E-BAAF-1EF1624DDCCB}" dt="2024-07-05T15:42:25.520" v="232"/>
+          <ac:picMkLst>
+            <pc:docMk/>
+            <pc:sldMk cId="2593531163" sldId="256"/>
+            <ac:picMk id="32" creationId="{69AA45D4-31AA-96C1-9F24-4E447DD7C573}"/>
           </ac:picMkLst>
         </pc:picChg>
         <pc:picChg chg="mod">
@@ -367,8 +447,8 @@
             <ac:picMk id="36" creationId="{7B721CCD-167B-59BA-C3FD-8F297E25F19D}"/>
           </ac:picMkLst>
         </pc:picChg>
-        <pc:picChg chg="add mod">
-          <ac:chgData name="RIVAS LUCANO, GUSTAVO" userId="5361705b-415d-4939-a7ef-76f2f9379335" providerId="ADAL" clId="{1A2818A9-C095-4D0E-BAAF-1EF1624DDCCB}" dt="2024-06-12T00:44:24.680" v="52" actId="1076"/>
+        <pc:picChg chg="add del mod">
+          <ac:chgData name="RIVAS LUCANO, GUSTAVO" userId="5361705b-415d-4939-a7ef-76f2f9379335" providerId="ADAL" clId="{1A2818A9-C095-4D0E-BAAF-1EF1624DDCCB}" dt="2024-07-05T15:41:44.971" v="223" actId="478"/>
           <ac:picMkLst>
             <pc:docMk/>
             <pc:sldMk cId="2593531163" sldId="256"/>
@@ -376,11 +456,35 @@
           </ac:picMkLst>
         </pc:picChg>
         <pc:picChg chg="add mod">
-          <ac:chgData name="RIVAS LUCANO, GUSTAVO" userId="5361705b-415d-4939-a7ef-76f2f9379335" providerId="ADAL" clId="{1A2818A9-C095-4D0E-BAAF-1EF1624DDCCB}" dt="2024-06-17T16:07:53.693" v="211" actId="1076"/>
+          <ac:chgData name="RIVAS LUCANO, GUSTAVO" userId="5361705b-415d-4939-a7ef-76f2f9379335" providerId="ADAL" clId="{1A2818A9-C095-4D0E-BAAF-1EF1624DDCCB}" dt="2024-07-05T15:48:11.058" v="427" actId="1076"/>
           <ac:picMkLst>
             <pc:docMk/>
             <pc:sldMk cId="2593531163" sldId="256"/>
             <ac:picMk id="61" creationId="{24F5C09A-DCCE-30A9-872E-C4D17653E8A2}"/>
+          </ac:picMkLst>
+        </pc:picChg>
+        <pc:picChg chg="mod">
+          <ac:chgData name="RIVAS LUCANO, GUSTAVO" userId="5361705b-415d-4939-a7ef-76f2f9379335" providerId="ADAL" clId="{1A2818A9-C095-4D0E-BAAF-1EF1624DDCCB}" dt="2024-07-05T15:46:15.677" v="366"/>
+          <ac:picMkLst>
+            <pc:docMk/>
+            <pc:sldMk cId="2593531163" sldId="256"/>
+            <ac:picMk id="67" creationId="{72F4C889-742C-D20D-8400-AE46BF62C5DF}"/>
+          </ac:picMkLst>
+        </pc:picChg>
+        <pc:picChg chg="add mod">
+          <ac:chgData name="RIVAS LUCANO, GUSTAVO" userId="5361705b-415d-4939-a7ef-76f2f9379335" providerId="ADAL" clId="{1A2818A9-C095-4D0E-BAAF-1EF1624DDCCB}" dt="2024-07-05T15:48:45.762" v="435" actId="1076"/>
+          <ac:picMkLst>
+            <pc:docMk/>
+            <pc:sldMk cId="2593531163" sldId="256"/>
+            <ac:picMk id="84" creationId="{701FAA4F-B9A7-F723-BCCE-10506BAD438F}"/>
+          </ac:picMkLst>
+        </pc:picChg>
+        <pc:picChg chg="add mod">
+          <ac:chgData name="RIVAS LUCANO, GUSTAVO" userId="5361705b-415d-4939-a7ef-76f2f9379335" providerId="ADAL" clId="{1A2818A9-C095-4D0E-BAAF-1EF1624DDCCB}" dt="2024-07-05T15:49:41.363" v="443" actId="1076"/>
+          <ac:picMkLst>
+            <pc:docMk/>
+            <pc:sldMk cId="2593531163" sldId="256"/>
+            <ac:picMk id="89" creationId="{59BA09D9-CBD0-7731-B935-F4805A9FAF1C}"/>
           </ac:picMkLst>
         </pc:picChg>
         <pc:cxnChg chg="add mod">
@@ -392,7 +496,7 @@
           </ac:cxnSpMkLst>
         </pc:cxnChg>
         <pc:cxnChg chg="add mod">
-          <ac:chgData name="RIVAS LUCANO, GUSTAVO" userId="5361705b-415d-4939-a7ef-76f2f9379335" providerId="ADAL" clId="{1A2818A9-C095-4D0E-BAAF-1EF1624DDCCB}" dt="2024-06-17T15:58:00.244" v="120" actId="14100"/>
+          <ac:chgData name="RIVAS LUCANO, GUSTAVO" userId="5361705b-415d-4939-a7ef-76f2f9379335" providerId="ADAL" clId="{1A2818A9-C095-4D0E-BAAF-1EF1624DDCCB}" dt="2024-07-05T15:46:00.614" v="362" actId="1076"/>
           <ac:cxnSpMkLst>
             <pc:docMk/>
             <pc:sldMk cId="2593531163" sldId="256"/>
@@ -400,23 +504,23 @@
           </ac:cxnSpMkLst>
         </pc:cxnChg>
         <pc:cxnChg chg="add mod">
-          <ac:chgData name="RIVAS LUCANO, GUSTAVO" userId="5361705b-415d-4939-a7ef-76f2f9379335" providerId="ADAL" clId="{1A2818A9-C095-4D0E-BAAF-1EF1624DDCCB}" dt="2024-06-17T16:00:26.101" v="129" actId="14100"/>
+          <ac:chgData name="RIVAS LUCANO, GUSTAVO" userId="5361705b-415d-4939-a7ef-76f2f9379335" providerId="ADAL" clId="{1A2818A9-C095-4D0E-BAAF-1EF1624DDCCB}" dt="2024-07-05T15:44:33.220" v="348" actId="1076"/>
           <ac:cxnSpMkLst>
             <pc:docMk/>
             <pc:sldMk cId="2593531163" sldId="256"/>
             <ac:cxnSpMk id="34" creationId="{F20221A1-6241-2A0B-9845-BE2A7745C4B9}"/>
           </ac:cxnSpMkLst>
         </pc:cxnChg>
-        <pc:cxnChg chg="add mod">
-          <ac:chgData name="RIVAS LUCANO, GUSTAVO" userId="5361705b-415d-4939-a7ef-76f2f9379335" providerId="ADAL" clId="{1A2818A9-C095-4D0E-BAAF-1EF1624DDCCB}" dt="2024-06-12T00:44:51.683" v="63" actId="1035"/>
+        <pc:cxnChg chg="add del mod">
+          <ac:chgData name="RIVAS LUCANO, GUSTAVO" userId="5361705b-415d-4939-a7ef-76f2f9379335" providerId="ADAL" clId="{1A2818A9-C095-4D0E-BAAF-1EF1624DDCCB}" dt="2024-07-05T15:42:12.081" v="229" actId="478"/>
           <ac:cxnSpMkLst>
             <pc:docMk/>
             <pc:sldMk cId="2593531163" sldId="256"/>
             <ac:cxnSpMk id="39" creationId="{F327BF39-D4D6-B8E4-6986-6A005D3375E7}"/>
           </ac:cxnSpMkLst>
         </pc:cxnChg>
-        <pc:cxnChg chg="add mod">
-          <ac:chgData name="RIVAS LUCANO, GUSTAVO" userId="5361705b-415d-4939-a7ef-76f2f9379335" providerId="ADAL" clId="{1A2818A9-C095-4D0E-BAAF-1EF1624DDCCB}" dt="2024-06-12T00:44:28.662" v="53" actId="14100"/>
+        <pc:cxnChg chg="add del mod">
+          <ac:chgData name="RIVAS LUCANO, GUSTAVO" userId="5361705b-415d-4939-a7ef-76f2f9379335" providerId="ADAL" clId="{1A2818A9-C095-4D0E-BAAF-1EF1624DDCCB}" dt="2024-07-05T15:46:11.550" v="365" actId="478"/>
           <ac:cxnSpMkLst>
             <pc:docMk/>
             <pc:sldMk cId="2593531163" sldId="256"/>
@@ -439,28 +543,60 @@
             <ac:cxnSpMk id="46" creationId="{76A3E8B0-0ADA-CD9C-D213-6C8E56D49E08}"/>
           </ac:cxnSpMkLst>
         </pc:cxnChg>
-        <pc:cxnChg chg="add mod">
-          <ac:chgData name="RIVAS LUCANO, GUSTAVO" userId="5361705b-415d-4939-a7ef-76f2f9379335" providerId="ADAL" clId="{1A2818A9-C095-4D0E-BAAF-1EF1624DDCCB}" dt="2024-06-17T15:59:22.789" v="125" actId="14100"/>
+        <pc:cxnChg chg="add del mod">
+          <ac:chgData name="RIVAS LUCANO, GUSTAVO" userId="5361705b-415d-4939-a7ef-76f2f9379335" providerId="ADAL" clId="{1A2818A9-C095-4D0E-BAAF-1EF1624DDCCB}" dt="2024-07-05T15:46:58.086" v="407" actId="478"/>
           <ac:cxnSpMkLst>
             <pc:docMk/>
             <pc:sldMk cId="2593531163" sldId="256"/>
             <ac:cxnSpMk id="51" creationId="{E3067468-19AA-F916-530F-8F7DA9A5CDE3}"/>
           </ac:cxnSpMkLst>
         </pc:cxnChg>
-        <pc:cxnChg chg="add">
-          <ac:chgData name="RIVAS LUCANO, GUSTAVO" userId="5361705b-415d-4939-a7ef-76f2f9379335" providerId="ADAL" clId="{1A2818A9-C095-4D0E-BAAF-1EF1624DDCCB}" dt="2024-06-12T00:42:43.618" v="45" actId="11529"/>
+        <pc:cxnChg chg="add del mod">
+          <ac:chgData name="RIVAS LUCANO, GUSTAVO" userId="5361705b-415d-4939-a7ef-76f2f9379335" providerId="ADAL" clId="{1A2818A9-C095-4D0E-BAAF-1EF1624DDCCB}" dt="2024-07-05T15:48:15.616" v="429" actId="478"/>
           <ac:cxnSpMkLst>
             <pc:docMk/>
             <pc:sldMk cId="2593531163" sldId="256"/>
             <ac:cxnSpMk id="54" creationId="{C17FEA67-F255-F106-6761-F349E2073E1B}"/>
           </ac:cxnSpMkLst>
         </pc:cxnChg>
-        <pc:cxnChg chg="add mod">
-          <ac:chgData name="RIVAS LUCANO, GUSTAVO" userId="5361705b-415d-4939-a7ef-76f2f9379335" providerId="ADAL" clId="{1A2818A9-C095-4D0E-BAAF-1EF1624DDCCB}" dt="2024-06-12T00:44:43.980" v="55" actId="11529"/>
+        <pc:cxnChg chg="add del mod">
+          <ac:chgData name="RIVAS LUCANO, GUSTAVO" userId="5361705b-415d-4939-a7ef-76f2f9379335" providerId="ADAL" clId="{1A2818A9-C095-4D0E-BAAF-1EF1624DDCCB}" dt="2024-07-05T15:46:10.657" v="364" actId="478"/>
           <ac:cxnSpMkLst>
             <pc:docMk/>
             <pc:sldMk cId="2593531163" sldId="256"/>
             <ac:cxnSpMk id="59" creationId="{971C1216-D5B3-FAA2-87FA-8273A5865D8C}"/>
+          </ac:cxnSpMkLst>
+        </pc:cxnChg>
+        <pc:cxnChg chg="add mod">
+          <ac:chgData name="RIVAS LUCANO, GUSTAVO" userId="5361705b-415d-4939-a7ef-76f2f9379335" providerId="ADAL" clId="{1A2818A9-C095-4D0E-BAAF-1EF1624DDCCB}" dt="2024-07-05T15:47:52.224" v="424" actId="14100"/>
+          <ac:cxnSpMkLst>
+            <pc:docMk/>
+            <pc:sldMk cId="2593531163" sldId="256"/>
+            <ac:cxnSpMk id="70" creationId="{65910AD8-C8E2-38F8-D4AA-4B6EE3A58A13}"/>
+          </ac:cxnSpMkLst>
+        </pc:cxnChg>
+        <pc:cxnChg chg="add mod">
+          <ac:chgData name="RIVAS LUCANO, GUSTAVO" userId="5361705b-415d-4939-a7ef-76f2f9379335" providerId="ADAL" clId="{1A2818A9-C095-4D0E-BAAF-1EF1624DDCCB}" dt="2024-07-05T15:47:56.349" v="425" actId="14100"/>
+          <ac:cxnSpMkLst>
+            <pc:docMk/>
+            <pc:sldMk cId="2593531163" sldId="256"/>
+            <ac:cxnSpMk id="74" creationId="{3FA31969-5370-1A4A-7A15-9A5F5BB8D290}"/>
+          </ac:cxnSpMkLst>
+        </pc:cxnChg>
+        <pc:cxnChg chg="add">
+          <ac:chgData name="RIVAS LUCANO, GUSTAVO" userId="5361705b-415d-4939-a7ef-76f2f9379335" providerId="ADAL" clId="{1A2818A9-C095-4D0E-BAAF-1EF1624DDCCB}" dt="2024-07-05T15:48:23.620" v="430" actId="11529"/>
+          <ac:cxnSpMkLst>
+            <pc:docMk/>
+            <pc:sldMk cId="2593531163" sldId="256"/>
+            <ac:cxnSpMk id="83" creationId="{58C998E3-444E-D861-D2EA-537CC2D0E929}"/>
+          </ac:cxnSpMkLst>
+        </pc:cxnChg>
+        <pc:cxnChg chg="add mod">
+          <ac:chgData name="RIVAS LUCANO, GUSTAVO" userId="5361705b-415d-4939-a7ef-76f2f9379335" providerId="ADAL" clId="{1A2818A9-C095-4D0E-BAAF-1EF1624DDCCB}" dt="2024-07-05T15:49:05.445" v="439" actId="14100"/>
+          <ac:cxnSpMkLst>
+            <pc:docMk/>
+            <pc:sldMk cId="2593531163" sldId="256"/>
+            <ac:cxnSpMk id="85" creationId="{CE423340-5842-F1F4-B9DE-17C2EBB716EF}"/>
           </ac:cxnSpMkLst>
         </pc:cxnChg>
       </pc:sldChg>
@@ -618,7 +754,7 @@
           <a:p>
             <a:fld id="{5C776C62-309A-4168-BA65-B214AC821404}" type="datetimeFigureOut">
               <a:rPr lang="es-MX" smtClean="0"/>
-              <a:t>17/06/2024</a:t>
+              <a:t>05/07/2024</a:t>
             </a:fld>
             <a:endParaRPr lang="es-MX"/>
           </a:p>
@@ -818,7 +954,7 @@
           <a:p>
             <a:fld id="{5C776C62-309A-4168-BA65-B214AC821404}" type="datetimeFigureOut">
               <a:rPr lang="es-MX" smtClean="0"/>
-              <a:t>17/06/2024</a:t>
+              <a:t>05/07/2024</a:t>
             </a:fld>
             <a:endParaRPr lang="es-MX"/>
           </a:p>
@@ -1028,7 +1164,7 @@
           <a:p>
             <a:fld id="{5C776C62-309A-4168-BA65-B214AC821404}" type="datetimeFigureOut">
               <a:rPr lang="es-MX" smtClean="0"/>
-              <a:t>17/06/2024</a:t>
+              <a:t>05/07/2024</a:t>
             </a:fld>
             <a:endParaRPr lang="es-MX"/>
           </a:p>
@@ -1228,7 +1364,7 @@
           <a:p>
             <a:fld id="{5C776C62-309A-4168-BA65-B214AC821404}" type="datetimeFigureOut">
               <a:rPr lang="es-MX" smtClean="0"/>
-              <a:t>17/06/2024</a:t>
+              <a:t>05/07/2024</a:t>
             </a:fld>
             <a:endParaRPr lang="es-MX"/>
           </a:p>
@@ -1504,7 +1640,7 @@
           <a:p>
             <a:fld id="{5C776C62-309A-4168-BA65-B214AC821404}" type="datetimeFigureOut">
               <a:rPr lang="es-MX" smtClean="0"/>
-              <a:t>17/06/2024</a:t>
+              <a:t>05/07/2024</a:t>
             </a:fld>
             <a:endParaRPr lang="es-MX"/>
           </a:p>
@@ -1772,7 +1908,7 @@
           <a:p>
             <a:fld id="{5C776C62-309A-4168-BA65-B214AC821404}" type="datetimeFigureOut">
               <a:rPr lang="es-MX" smtClean="0"/>
-              <a:t>17/06/2024</a:t>
+              <a:t>05/07/2024</a:t>
             </a:fld>
             <a:endParaRPr lang="es-MX"/>
           </a:p>
@@ -2187,7 +2323,7 @@
           <a:p>
             <a:fld id="{5C776C62-309A-4168-BA65-B214AC821404}" type="datetimeFigureOut">
               <a:rPr lang="es-MX" smtClean="0"/>
-              <a:t>17/06/2024</a:t>
+              <a:t>05/07/2024</a:t>
             </a:fld>
             <a:endParaRPr lang="es-MX"/>
           </a:p>
@@ -2329,7 +2465,7 @@
           <a:p>
             <a:fld id="{5C776C62-309A-4168-BA65-B214AC821404}" type="datetimeFigureOut">
               <a:rPr lang="es-MX" smtClean="0"/>
-              <a:t>17/06/2024</a:t>
+              <a:t>05/07/2024</a:t>
             </a:fld>
             <a:endParaRPr lang="es-MX"/>
           </a:p>
@@ -2442,7 +2578,7 @@
           <a:p>
             <a:fld id="{5C776C62-309A-4168-BA65-B214AC821404}" type="datetimeFigureOut">
               <a:rPr lang="es-MX" smtClean="0"/>
-              <a:t>17/06/2024</a:t>
+              <a:t>05/07/2024</a:t>
             </a:fld>
             <a:endParaRPr lang="es-MX"/>
           </a:p>
@@ -2755,7 +2891,7 @@
           <a:p>
             <a:fld id="{5C776C62-309A-4168-BA65-B214AC821404}" type="datetimeFigureOut">
               <a:rPr lang="es-MX" smtClean="0"/>
-              <a:t>17/06/2024</a:t>
+              <a:t>05/07/2024</a:t>
             </a:fld>
             <a:endParaRPr lang="es-MX"/>
           </a:p>
@@ -3044,7 +3180,7 @@
           <a:p>
             <a:fld id="{5C776C62-309A-4168-BA65-B214AC821404}" type="datetimeFigureOut">
               <a:rPr lang="es-MX" smtClean="0"/>
-              <a:t>17/06/2024</a:t>
+              <a:t>05/07/2024</a:t>
             </a:fld>
             <a:endParaRPr lang="es-MX"/>
           </a:p>
@@ -3287,7 +3423,7 @@
           <a:p>
             <a:fld id="{5C776C62-309A-4168-BA65-B214AC821404}" type="datetimeFigureOut">
               <a:rPr lang="es-MX" smtClean="0"/>
-              <a:t>17/06/2024</a:t>
+              <a:t>05/07/2024</a:t>
             </a:fld>
             <a:endParaRPr lang="es-MX"/>
           </a:p>
@@ -3837,9 +3973,9 @@
         <p:grpSpPr>
           <a:xfrm>
             <a:off x="6563763" y="2067866"/>
-            <a:ext cx="1057928" cy="790108"/>
+            <a:ext cx="1151876" cy="820886"/>
             <a:chOff x="2263602" y="3064032"/>
-            <a:chExt cx="1057928" cy="748803"/>
+            <a:chExt cx="1151876" cy="777972"/>
           </a:xfrm>
         </p:grpSpPr>
         <p:pic>
@@ -3893,7 +4029,7 @@
           <p:spPr>
             <a:xfrm>
               <a:off x="2263602" y="3491980"/>
-              <a:ext cx="1057928" cy="320855"/>
+              <a:ext cx="1151876" cy="350024"/>
             </a:xfrm>
             <a:prstGeom prst="rect">
               <a:avLst/>
@@ -3907,8 +4043,8 @@
             <a:lstStyle/>
             <a:p>
               <a:r>
-                <a:rPr lang="es-MX" sz="1600" dirty="0" err="1"/>
-                <a:t>HoneyPot</a:t>
+                <a:rPr lang="es-MX" dirty="0" err="1"/>
+                <a:t>Heralding</a:t>
               </a:r>
               <a:endParaRPr lang="es-MX" dirty="0"/>
             </a:p>
@@ -3929,7 +4065,7 @@
         </p:nvGrpSpPr>
         <p:grpSpPr>
           <a:xfrm>
-            <a:off x="6758051" y="4742539"/>
+            <a:off x="6815201" y="4742539"/>
             <a:ext cx="669352" cy="715153"/>
             <a:chOff x="7968311" y="3219446"/>
             <a:chExt cx="669352" cy="715153"/>
@@ -4217,8 +4353,8 @@
         </p:nvGrpSpPr>
         <p:grpSpPr>
           <a:xfrm>
-            <a:off x="5813218" y="3982231"/>
-            <a:ext cx="4567497" cy="2328267"/>
+            <a:off x="5813218" y="4273550"/>
+            <a:ext cx="4675499" cy="2036948"/>
             <a:chOff x="5262303" y="2694754"/>
             <a:chExt cx="4567497" cy="2328267"/>
           </a:xfrm>
@@ -4331,224 +4467,6 @@
       </p:grpSp>
       <p:grpSp>
         <p:nvGrpSpPr>
-          <p:cNvPr id="28" name="Grupo 27">
-            <a:extLst>
-              <a:ext uri="{FF2B5EF4-FFF2-40B4-BE49-F238E27FC236}">
-                <a16:creationId xmlns:a16="http://schemas.microsoft.com/office/drawing/2014/main" id="{6647DA33-A407-2CC2-D580-9DE85BA3518B}"/>
-              </a:ext>
-            </a:extLst>
-          </p:cNvPr>
-          <p:cNvGrpSpPr/>
-          <p:nvPr/>
-        </p:nvGrpSpPr>
-        <p:grpSpPr>
-          <a:xfrm>
-            <a:off x="8357283" y="2077314"/>
-            <a:ext cx="718407" cy="681270"/>
-            <a:chOff x="4811244" y="4485369"/>
-            <a:chExt cx="718407" cy="681270"/>
-          </a:xfrm>
-        </p:grpSpPr>
-        <p:pic>
-          <p:nvPicPr>
-            <p:cNvPr id="22" name="Graphic 55" descr="Volume resource icon for the Amazon EBS service.">
-              <a:extLst>
-                <a:ext uri="{FF2B5EF4-FFF2-40B4-BE49-F238E27FC236}">
-                  <a16:creationId xmlns:a16="http://schemas.microsoft.com/office/drawing/2014/main" id="{9BFEEF86-BC0A-A204-5CAD-13A4631C7D08}"/>
-                </a:ext>
-              </a:extLst>
-            </p:cNvPr>
-            <p:cNvPicPr>
-              <a:picLocks noChangeAspect="1"/>
-            </p:cNvPicPr>
-            <p:nvPr/>
-          </p:nvPicPr>
-          <p:blipFill>
-            <a:blip r:embed="rId10">
-              <a:extLst>
-                <a:ext uri="{96DAC541-7B7A-43D3-8B79-37D633B846F1}">
-                  <asvg:svgBlip xmlns:asvg="http://schemas.microsoft.com/office/drawing/2016/SVG/main" r:embed="rId11"/>
-                </a:ext>
-              </a:extLst>
-            </a:blip>
-            <a:stretch>
-              <a:fillRect/>
-            </a:stretch>
-          </p:blipFill>
-          <p:spPr>
-            <a:xfrm>
-              <a:off x="4930925" y="4485369"/>
-              <a:ext cx="457200" cy="457200"/>
-            </a:xfrm>
-            <a:prstGeom prst="rect">
-              <a:avLst/>
-            </a:prstGeom>
-          </p:spPr>
-        </p:pic>
-        <p:sp>
-          <p:nvSpPr>
-            <p:cNvPr id="23" name="TextBox 20">
-              <a:extLst>
-                <a:ext uri="{FF2B5EF4-FFF2-40B4-BE49-F238E27FC236}">
-                  <a16:creationId xmlns:a16="http://schemas.microsoft.com/office/drawing/2014/main" id="{0B44E6D5-8531-57E4-3334-72F2A67ED10A}"/>
-                </a:ext>
-              </a:extLst>
-            </p:cNvPr>
-            <p:cNvSpPr txBox="1">
-              <a:spLocks noChangeArrowheads="1"/>
-            </p:cNvSpPr>
-            <p:nvPr/>
-          </p:nvSpPr>
-          <p:spPr bwMode="auto">
-            <a:xfrm>
-              <a:off x="4811244" y="4889640"/>
-              <a:ext cx="718407" cy="276999"/>
-            </a:xfrm>
-            <a:prstGeom prst="rect">
-              <a:avLst/>
-            </a:prstGeom>
-            <a:noFill/>
-            <a:ln>
-              <a:noFill/>
-            </a:ln>
-            <a:extLst>
-              <a:ext uri="{909E8E84-426E-40DD-AFC4-6F175D3DCCD1}">
-                <a14:hiddenFill xmlns:a14="http://schemas.microsoft.com/office/drawing/2010/main">
-                  <a:solidFill>
-                    <a:srgbClr val="FFFFFF"/>
-                  </a:solidFill>
-                </a14:hiddenFill>
-              </a:ext>
-              <a:ext uri="{91240B29-F687-4F45-9708-019B960494DF}">
-                <a14:hiddenLine xmlns:a14="http://schemas.microsoft.com/office/drawing/2010/main" w="9525">
-                  <a:solidFill>
-                    <a:srgbClr val="000000"/>
-                  </a:solidFill>
-                  <a:miter lim="800000"/>
-                  <a:headEnd/>
-                  <a:tailEnd/>
-                </a14:hiddenLine>
-              </a:ext>
-            </a:extLst>
-          </p:spPr>
-          <p:txBody>
-            <a:bodyPr wrap="square">
-              <a:spAutoFit/>
-            </a:bodyPr>
-            <a:lstStyle>
-              <a:lvl1pPr>
-                <a:defRPr>
-                  <a:solidFill>
-                    <a:schemeClr val="tx1"/>
-                  </a:solidFill>
-                  <a:latin typeface="Calibri" panose="020F0502020204030204" pitchFamily="34" charset="0"/>
-                </a:defRPr>
-              </a:lvl1pPr>
-              <a:lvl2pPr marL="742950" indent="-285750">
-                <a:defRPr>
-                  <a:solidFill>
-                    <a:schemeClr val="tx1"/>
-                  </a:solidFill>
-                  <a:latin typeface="Calibri" panose="020F0502020204030204" pitchFamily="34" charset="0"/>
-                </a:defRPr>
-              </a:lvl2pPr>
-              <a:lvl3pPr marL="1143000" indent="-228600">
-                <a:defRPr>
-                  <a:solidFill>
-                    <a:schemeClr val="tx1"/>
-                  </a:solidFill>
-                  <a:latin typeface="Calibri" panose="020F0502020204030204" pitchFamily="34" charset="0"/>
-                </a:defRPr>
-              </a:lvl3pPr>
-              <a:lvl4pPr marL="1600200" indent="-228600">
-                <a:defRPr>
-                  <a:solidFill>
-                    <a:schemeClr val="tx1"/>
-                  </a:solidFill>
-                  <a:latin typeface="Calibri" panose="020F0502020204030204" pitchFamily="34" charset="0"/>
-                </a:defRPr>
-              </a:lvl4pPr>
-              <a:lvl5pPr marL="2057400" indent="-228600">
-                <a:defRPr>
-                  <a:solidFill>
-                    <a:schemeClr val="tx1"/>
-                  </a:solidFill>
-                  <a:latin typeface="Calibri" panose="020F0502020204030204" pitchFamily="34" charset="0"/>
-                </a:defRPr>
-              </a:lvl5pPr>
-              <a:lvl6pPr marL="2514600" indent="-228600" eaLnBrk="0" fontAlgn="base" hangingPunct="0">
-                <a:spcBef>
-                  <a:spcPct val="0"/>
-                </a:spcBef>
-                <a:spcAft>
-                  <a:spcPct val="0"/>
-                </a:spcAft>
-                <a:defRPr>
-                  <a:solidFill>
-                    <a:schemeClr val="tx1"/>
-                  </a:solidFill>
-                  <a:latin typeface="Calibri" panose="020F0502020204030204" pitchFamily="34" charset="0"/>
-                </a:defRPr>
-              </a:lvl6pPr>
-              <a:lvl7pPr marL="2971800" indent="-228600" eaLnBrk="0" fontAlgn="base" hangingPunct="0">
-                <a:spcBef>
-                  <a:spcPct val="0"/>
-                </a:spcBef>
-                <a:spcAft>
-                  <a:spcPct val="0"/>
-                </a:spcAft>
-                <a:defRPr>
-                  <a:solidFill>
-                    <a:schemeClr val="tx1"/>
-                  </a:solidFill>
-                  <a:latin typeface="Calibri" panose="020F0502020204030204" pitchFamily="34" charset="0"/>
-                </a:defRPr>
-              </a:lvl7pPr>
-              <a:lvl8pPr marL="3429000" indent="-228600" eaLnBrk="0" fontAlgn="base" hangingPunct="0">
-                <a:spcBef>
-                  <a:spcPct val="0"/>
-                </a:spcBef>
-                <a:spcAft>
-                  <a:spcPct val="0"/>
-                </a:spcAft>
-                <a:defRPr>
-                  <a:solidFill>
-                    <a:schemeClr val="tx1"/>
-                  </a:solidFill>
-                  <a:latin typeface="Calibri" panose="020F0502020204030204" pitchFamily="34" charset="0"/>
-                </a:defRPr>
-              </a:lvl8pPr>
-              <a:lvl9pPr marL="3886200" indent="-228600" eaLnBrk="0" fontAlgn="base" hangingPunct="0">
-                <a:spcBef>
-                  <a:spcPct val="0"/>
-                </a:spcBef>
-                <a:spcAft>
-                  <a:spcPct val="0"/>
-                </a:spcAft>
-                <a:defRPr>
-                  <a:solidFill>
-                    <a:schemeClr val="tx1"/>
-                  </a:solidFill>
-                  <a:latin typeface="Calibri" panose="020F0502020204030204" pitchFamily="34" charset="0"/>
-                </a:defRPr>
-              </a:lvl9pPr>
-            </a:lstStyle>
-            <a:p>
-              <a:pPr algn="ctr" eaLnBrk="1" hangingPunct="1"/>
-              <a:r>
-                <a:rPr lang="en-US" altLang="en-US" sz="1200" dirty="0">
-                  <a:latin typeface="Arial" panose="020B0604020202020204" pitchFamily="34" charset="0"/>
-                  <a:ea typeface="Amazon Ember" panose="020B0603020204020204" pitchFamily="34" charset="0"/>
-                  <a:cs typeface="Arial" panose="020B0604020202020204" pitchFamily="34" charset="0"/>
-                </a:rPr>
-                <a:t>Volume</a:t>
-              </a:r>
-            </a:p>
-          </p:txBody>
-        </p:sp>
-      </p:grpSp>
-      <p:grpSp>
-        <p:nvGrpSpPr>
           <p:cNvPr id="25" name="Group 9" descr="Public subnet group.">
             <a:extLst>
               <a:ext uri="{FF2B5EF4-FFF2-40B4-BE49-F238E27FC236}">
@@ -4562,7 +4480,7 @@
         <p:grpSpPr>
           <a:xfrm>
             <a:off x="5822781" y="1750611"/>
-            <a:ext cx="4557933" cy="1080057"/>
+            <a:ext cx="4557933" cy="1799871"/>
             <a:chOff x="6147453" y="2618865"/>
             <a:chExt cx="4557933" cy="1071462"/>
           </a:xfrm>
@@ -4652,10 +4570,10 @@
             <p:nvPr/>
           </p:nvPicPr>
           <p:blipFill>
-            <a:blip r:embed="rId12">
+            <a:blip r:embed="rId10">
               <a:extLst>
                 <a:ext uri="{96DAC541-7B7A-43D3-8B79-37D633B846F1}">
-                  <asvg:svgBlip xmlns:asvg="http://schemas.microsoft.com/office/drawing/2016/SVG/main" r:embed="rId13"/>
+                  <asvg:svgBlip xmlns:asvg="http://schemas.microsoft.com/office/drawing/2016/SVG/main" r:embed="rId11"/>
                 </a:ext>
               </a:extLst>
             </a:blip>
@@ -4687,7 +4605,7 @@
         </p:nvGrpSpPr>
         <p:grpSpPr>
           <a:xfrm>
-            <a:off x="8336098" y="4087746"/>
+            <a:off x="7870940" y="4906881"/>
             <a:ext cx="909858" cy="733937"/>
             <a:chOff x="3200567" y="3525293"/>
             <a:chExt cx="909858" cy="733937"/>
@@ -4708,10 +4626,10 @@
             <p:nvPr/>
           </p:nvPicPr>
           <p:blipFill>
-            <a:blip r:embed="rId14">
+            <a:blip r:embed="rId12">
               <a:extLst>
                 <a:ext uri="{96DAC541-7B7A-43D3-8B79-37D633B846F1}">
-                  <asvg:svgBlip xmlns:asvg="http://schemas.microsoft.com/office/drawing/2016/SVG/main" r:embed="rId15"/>
+                  <asvg:svgBlip xmlns:asvg="http://schemas.microsoft.com/office/drawing/2016/SVG/main" r:embed="rId13"/>
                 </a:ext>
               </a:extLst>
             </a:blip>
@@ -5018,10 +4936,10 @@
             <p:nvPr/>
           </p:nvPicPr>
           <p:blipFill>
-            <a:blip r:embed="rId16">
+            <a:blip r:embed="rId14">
               <a:extLst>
                 <a:ext uri="{96DAC541-7B7A-43D3-8B79-37D633B846F1}">
-                  <asvg:svgBlip xmlns:asvg="http://schemas.microsoft.com/office/drawing/2016/SVG/main" r:embed="rId17"/>
+                  <asvg:svgBlip xmlns:asvg="http://schemas.microsoft.com/office/drawing/2016/SVG/main" r:embed="rId15"/>
                 </a:ext>
               </a:extLst>
             </a:blip>
@@ -5289,10 +5207,10 @@
             <p:nvPr/>
           </p:nvPicPr>
           <p:blipFill>
-            <a:blip r:embed="rId18">
+            <a:blip r:embed="rId16">
               <a:extLst>
                 <a:ext uri="{96DAC541-7B7A-43D3-8B79-37D633B846F1}">
-                  <asvg:svgBlip xmlns:asvg="http://schemas.microsoft.com/office/drawing/2016/SVG/main" r:embed="rId19"/>
+                  <asvg:svgBlip xmlns:asvg="http://schemas.microsoft.com/office/drawing/2016/SVG/main" r:embed="rId17"/>
                 </a:ext>
               </a:extLst>
             </a:blip>
@@ -5399,151 +5317,23 @@
       </p:cxnSp>
       <p:cxnSp>
         <p:nvCxnSpPr>
-          <p:cNvPr id="39" name="Conector recto de flecha 38">
-            <a:extLst>
-              <a:ext uri="{FF2B5EF4-FFF2-40B4-BE49-F238E27FC236}">
-                <a16:creationId xmlns:a16="http://schemas.microsoft.com/office/drawing/2014/main" id="{F327BF39-D4D6-B8E4-6986-6A005D3375E7}"/>
+          <p:cNvPr id="17" name="Conector recto de flecha 16">
+            <a:extLst>
+              <a:ext uri="{FF2B5EF4-FFF2-40B4-BE49-F238E27FC236}">
+                <a16:creationId xmlns:a16="http://schemas.microsoft.com/office/drawing/2014/main" id="{3E4F2843-1E35-0C2E-BCD9-08313F4371B9}"/>
               </a:ext>
             </a:extLst>
           </p:cNvPr>
           <p:cNvCxnSpPr>
-            <a:stCxn id="6" idx="3"/>
-            <a:endCxn id="22" idx="1"/>
+            <a:cxnSpLocks/>
+            <a:endCxn id="29" idx="0"/>
           </p:cNvCxnSpPr>
           <p:nvPr/>
         </p:nvCxnSpPr>
         <p:spPr>
-          <a:xfrm flipV="1">
-            <a:off x="7318632" y="2305914"/>
-            <a:ext cx="1158332" cy="3162"/>
-          </a:xfrm>
-          <a:prstGeom prst="straightConnector1">
-            <a:avLst/>
-          </a:prstGeom>
-          <a:ln>
-            <a:tailEnd type="triangle"/>
-          </a:ln>
-        </p:spPr>
-        <p:style>
-          <a:lnRef idx="2">
-            <a:schemeClr val="accent1"/>
-          </a:lnRef>
-          <a:fillRef idx="0">
-            <a:schemeClr val="accent1"/>
-          </a:fillRef>
-          <a:effectRef idx="1">
-            <a:schemeClr val="accent1"/>
-          </a:effectRef>
-          <a:fontRef idx="minor">
-            <a:schemeClr val="tx1"/>
-          </a:fontRef>
-        </p:style>
-      </p:cxnSp>
-      <p:cxnSp>
-        <p:nvCxnSpPr>
-          <p:cNvPr id="42" name="Conector recto de flecha 41">
-            <a:extLst>
-              <a:ext uri="{FF2B5EF4-FFF2-40B4-BE49-F238E27FC236}">
-                <a16:creationId xmlns:a16="http://schemas.microsoft.com/office/drawing/2014/main" id="{14409FC3-5B67-CFE9-8F20-1514FF2BDFC9}"/>
-              </a:ext>
-            </a:extLst>
-          </p:cNvPr>
-          <p:cNvCxnSpPr>
-            <a:cxnSpLocks/>
-            <a:stCxn id="7" idx="2"/>
-            <a:endCxn id="55" idx="0"/>
-          </p:cNvCxnSpPr>
-          <p:nvPr/>
-        </p:nvCxnSpPr>
-        <p:spPr>
-          <a:xfrm>
-            <a:off x="7092727" y="2857974"/>
-            <a:ext cx="2774" cy="182248"/>
-          </a:xfrm>
-          <a:prstGeom prst="straightConnector1">
-            <a:avLst/>
-          </a:prstGeom>
-          <a:ln>
-            <a:tailEnd type="triangle"/>
-          </a:ln>
-        </p:spPr>
-        <p:style>
-          <a:lnRef idx="2">
-            <a:schemeClr val="accent1"/>
-          </a:lnRef>
-          <a:fillRef idx="0">
-            <a:schemeClr val="accent1"/>
-          </a:fillRef>
-          <a:effectRef idx="1">
-            <a:schemeClr val="accent1"/>
-          </a:effectRef>
-          <a:fontRef idx="minor">
-            <a:schemeClr val="tx1"/>
-          </a:fontRef>
-        </p:style>
-      </p:cxnSp>
-      <p:cxnSp>
-        <p:nvCxnSpPr>
-          <p:cNvPr id="51" name="Conector recto de flecha 50">
-            <a:extLst>
-              <a:ext uri="{FF2B5EF4-FFF2-40B4-BE49-F238E27FC236}">
-                <a16:creationId xmlns:a16="http://schemas.microsoft.com/office/drawing/2014/main" id="{E3067468-19AA-F916-530F-8F7DA9A5CDE3}"/>
-              </a:ext>
-            </a:extLst>
-          </p:cNvPr>
-          <p:cNvCxnSpPr>
-            <a:cxnSpLocks/>
-            <a:stCxn id="8" idx="3"/>
-            <a:endCxn id="47" idx="1"/>
-          </p:cNvCxnSpPr>
-          <p:nvPr/>
-        </p:nvCxnSpPr>
-        <p:spPr>
-          <a:xfrm flipV="1">
-            <a:off x="7321327" y="3576426"/>
-            <a:ext cx="845111" cy="1394713"/>
-          </a:xfrm>
-          <a:prstGeom prst="straightConnector1">
-            <a:avLst/>
-          </a:prstGeom>
-          <a:ln>
-            <a:tailEnd type="triangle"/>
-          </a:ln>
-        </p:spPr>
-        <p:style>
-          <a:lnRef idx="2">
-            <a:schemeClr val="accent1"/>
-          </a:lnRef>
-          <a:fillRef idx="0">
-            <a:schemeClr val="accent1"/>
-          </a:fillRef>
-          <a:effectRef idx="1">
-            <a:schemeClr val="accent1"/>
-          </a:effectRef>
-          <a:fontRef idx="minor">
-            <a:schemeClr val="tx1"/>
-          </a:fontRef>
-        </p:style>
-      </p:cxnSp>
-      <p:cxnSp>
-        <p:nvCxnSpPr>
-          <p:cNvPr id="54" name="Conector recto de flecha 53">
-            <a:extLst>
-              <a:ext uri="{FF2B5EF4-FFF2-40B4-BE49-F238E27FC236}">
-                <a16:creationId xmlns:a16="http://schemas.microsoft.com/office/drawing/2014/main" id="{C17FEA67-F255-F106-6761-F349E2073E1B}"/>
-              </a:ext>
-            </a:extLst>
-          </p:cNvPr>
-          <p:cNvCxnSpPr>
-            <a:stCxn id="30" idx="2"/>
-            <a:endCxn id="32" idx="0"/>
-          </p:cNvCxnSpPr>
-          <p:nvPr/>
-        </p:nvCxnSpPr>
-        <p:spPr>
-          <a:xfrm>
-            <a:off x="8791027" y="4821683"/>
-            <a:ext cx="0" cy="413193"/>
+          <a:xfrm flipH="1">
+            <a:off x="8325869" y="4165771"/>
+            <a:ext cx="8977" cy="741110"/>
           </a:xfrm>
           <a:prstGeom prst="straightConnector1">
             <a:avLst/>
@@ -5569,10 +5359,10 @@
       </p:cxnSp>
       <p:pic>
         <p:nvPicPr>
-          <p:cNvPr id="55" name="lambda" descr="Lambda service icon.">
-            <a:extLst>
-              <a:ext uri="{FF2B5EF4-FFF2-40B4-BE49-F238E27FC236}">
-                <a16:creationId xmlns:a16="http://schemas.microsoft.com/office/drawing/2014/main" id="{F2F72066-1107-4E4F-94FE-7C2E6686B1F5}"/>
+          <p:cNvPr id="61" name="Graphic 14" descr="Amazon Athena service icon.">
+            <a:extLst>
+              <a:ext uri="{FF2B5EF4-FFF2-40B4-BE49-F238E27FC236}">
+                <a16:creationId xmlns:a16="http://schemas.microsoft.com/office/drawing/2014/main" id="{24F5C09A-DCCE-30A9-872E-C4D17653E8A2}"/>
               </a:ext>
             </a:extLst>
           </p:cNvPr>
@@ -5582,10 +5372,10 @@
           <p:nvPr/>
         </p:nvPicPr>
         <p:blipFill>
-          <a:blip r:embed="rId20">
+          <a:blip r:embed="rId18">
             <a:extLst>
               <a:ext uri="{96DAC541-7B7A-43D3-8B79-37D633B846F1}">
-                <asvg:svgBlip xmlns:asvg="http://schemas.microsoft.com/office/drawing/2016/SVG/main" r:embed="rId21"/>
+                <asvg:svgBlip xmlns:asvg="http://schemas.microsoft.com/office/drawing/2016/SVG/main" r:embed="rId19"/>
               </a:ext>
             </a:extLst>
           </a:blip>
@@ -5594,8 +5384,8 @@
         </p:blipFill>
         <p:spPr bwMode="auto">
           <a:xfrm>
-            <a:off x="6872370" y="3040222"/>
-            <a:ext cx="446262" cy="446262"/>
+            <a:off x="9681547" y="4923214"/>
+            <a:ext cx="440605" cy="440605"/>
           </a:xfrm>
           <a:prstGeom prst="rect">
             <a:avLst/>
@@ -5625,165 +5415,23 @@
           </a:extLst>
         </p:spPr>
       </p:pic>
-      <p:cxnSp>
-        <p:nvCxnSpPr>
-          <p:cNvPr id="59" name="Conector recto de flecha 58">
-            <a:extLst>
-              <a:ext uri="{FF2B5EF4-FFF2-40B4-BE49-F238E27FC236}">
-                <a16:creationId xmlns:a16="http://schemas.microsoft.com/office/drawing/2014/main" id="{971C1216-D5B3-FAA2-87FA-8273A5865D8C}"/>
-              </a:ext>
-            </a:extLst>
-          </p:cNvPr>
-          <p:cNvCxnSpPr>
-            <a:endCxn id="8" idx="0"/>
-          </p:cNvCxnSpPr>
+      <p:sp>
+        <p:nvSpPr>
+          <p:cNvPr id="63" name="label5">
+            <a:extLst>
+              <a:ext uri="{FF2B5EF4-FFF2-40B4-BE49-F238E27FC236}">
+                <a16:creationId xmlns:a16="http://schemas.microsoft.com/office/drawing/2014/main" id="{33049AE0-0CDF-0569-8F62-BE3421A974E8}"/>
+              </a:ext>
+            </a:extLst>
+          </p:cNvPr>
+          <p:cNvSpPr txBox="1">
+            <a:spLocks noChangeArrowheads="1"/>
+          </p:cNvSpPr>
           <p:nvPr/>
-        </p:nvCxnSpPr>
-        <p:spPr>
-          <a:xfrm>
-            <a:off x="7090032" y="3747136"/>
-            <a:ext cx="2695" cy="995403"/>
-          </a:xfrm>
-          <a:prstGeom prst="straightConnector1">
-            <a:avLst/>
-          </a:prstGeom>
-          <a:ln>
-            <a:tailEnd type="triangle"/>
-          </a:ln>
-        </p:spPr>
-        <p:style>
-          <a:lnRef idx="2">
-            <a:schemeClr val="accent1"/>
-          </a:lnRef>
-          <a:fillRef idx="0">
-            <a:schemeClr val="accent1"/>
-          </a:fillRef>
-          <a:effectRef idx="1">
-            <a:schemeClr val="accent1"/>
-          </a:effectRef>
-          <a:fontRef idx="minor">
-            <a:schemeClr val="tx1"/>
-          </a:fontRef>
-        </p:style>
-      </p:cxnSp>
-      <p:pic>
-        <p:nvPicPr>
-          <p:cNvPr id="3" name="lambda" descr="Lambda service icon.">
-            <a:extLst>
-              <a:ext uri="{FF2B5EF4-FFF2-40B4-BE49-F238E27FC236}">
-                <a16:creationId xmlns:a16="http://schemas.microsoft.com/office/drawing/2014/main" id="{823352ED-71FC-AFB1-FDE9-07FB334A9B9A}"/>
-              </a:ext>
-            </a:extLst>
-          </p:cNvPr>
-          <p:cNvPicPr>
-            <a:picLocks noChangeAspect="1" noChangeArrowheads="1"/>
-          </p:cNvPicPr>
-          <p:nvPr/>
-        </p:nvPicPr>
-        <p:blipFill>
-          <a:blip r:embed="rId20">
-            <a:extLst>
-              <a:ext uri="{96DAC541-7B7A-43D3-8B79-37D633B846F1}">
-                <asvg:svgBlip xmlns:asvg="http://schemas.microsoft.com/office/drawing/2016/SVG/main" r:embed="rId21"/>
-              </a:ext>
-            </a:extLst>
-          </a:blip>
-          <a:srcRect/>
-          <a:stretch/>
-        </p:blipFill>
+        </p:nvSpPr>
         <p:spPr bwMode="auto">
           <a:xfrm>
-            <a:off x="8552035" y="3018158"/>
-            <a:ext cx="446262" cy="446262"/>
-          </a:xfrm>
-          <a:prstGeom prst="rect">
-            <a:avLst/>
-          </a:prstGeom>
-          <a:noFill/>
-          <a:ln>
-            <a:noFill/>
-          </a:ln>
-          <a:extLst>
-            <a:ext uri="{909E8E84-426E-40DD-AFC4-6F175D3DCCD1}">
-              <a14:hiddenFill xmlns:a14="http://schemas.microsoft.com/office/drawing/2010/main">
-                <a:solidFill>
-                  <a:srgbClr val="FFFFFF"/>
-                </a:solidFill>
-              </a14:hiddenFill>
-            </a:ext>
-            <a:ext uri="{91240B29-F687-4F45-9708-019B960494DF}">
-              <a14:hiddenLine xmlns:a14="http://schemas.microsoft.com/office/drawing/2010/main" w="9525">
-                <a:solidFill>
-                  <a:srgbClr val="000000"/>
-                </a:solidFill>
-                <a:miter lim="800000"/>
-                <a:headEnd/>
-                <a:tailEnd/>
-              </a14:hiddenLine>
-            </a:ext>
-          </a:extLst>
-        </p:spPr>
-      </p:pic>
-      <p:cxnSp>
-        <p:nvCxnSpPr>
-          <p:cNvPr id="17" name="Conector recto de flecha 16">
-            <a:extLst>
-              <a:ext uri="{FF2B5EF4-FFF2-40B4-BE49-F238E27FC236}">
-                <a16:creationId xmlns:a16="http://schemas.microsoft.com/office/drawing/2014/main" id="{3E4F2843-1E35-0C2E-BCD9-08313F4371B9}"/>
-              </a:ext>
-            </a:extLst>
-          </p:cNvPr>
-          <p:cNvCxnSpPr>
-            <a:cxnSpLocks/>
-            <a:stCxn id="47" idx="2"/>
-            <a:endCxn id="29" idx="0"/>
-          </p:cNvCxnSpPr>
-          <p:nvPr/>
-        </p:nvCxnSpPr>
-        <p:spPr>
-          <a:xfrm>
-            <a:off x="8785645" y="3714925"/>
-            <a:ext cx="5382" cy="372821"/>
-          </a:xfrm>
-          <a:prstGeom prst="straightConnector1">
-            <a:avLst/>
-          </a:prstGeom>
-          <a:ln>
-            <a:tailEnd type="triangle"/>
-          </a:ln>
-        </p:spPr>
-        <p:style>
-          <a:lnRef idx="2">
-            <a:schemeClr val="accent1"/>
-          </a:lnRef>
-          <a:fillRef idx="0">
-            <a:schemeClr val="accent1"/>
-          </a:fillRef>
-          <a:effectRef idx="1">
-            <a:schemeClr val="accent1"/>
-          </a:effectRef>
-          <a:fontRef idx="minor">
-            <a:schemeClr val="tx1"/>
-          </a:fontRef>
-        </p:style>
-      </p:cxnSp>
-      <p:sp>
-        <p:nvSpPr>
-          <p:cNvPr id="47" name="label5">
-            <a:extLst>
-              <a:ext uri="{FF2B5EF4-FFF2-40B4-BE49-F238E27FC236}">
-                <a16:creationId xmlns:a16="http://schemas.microsoft.com/office/drawing/2014/main" id="{CF7557F0-1536-C7B3-4EC0-ED459EA66587}"/>
-              </a:ext>
-            </a:extLst>
-          </p:cNvPr>
-          <p:cNvSpPr txBox="1">
-            <a:spLocks noChangeArrowheads="1"/>
-          </p:cNvSpPr>
-          <p:nvPr/>
-        </p:nvSpPr>
-        <p:spPr bwMode="auto">
-          <a:xfrm>
-            <a:off x="8166438" y="3437926"/>
+            <a:off x="9271241" y="5396045"/>
             <a:ext cx="1238413" cy="276999"/>
           </a:xfrm>
           <a:prstGeom prst="rect">
@@ -5922,28 +5570,236 @@
                 <a:latin typeface="Arial" panose="020B0604020202020204" pitchFamily="34" charset="0"/>
                 <a:cs typeface="Arial" panose="020B0604020202020204" pitchFamily="34" charset="0"/>
               </a:rPr>
-              <a:t>Mover </a:t>
-            </a:r>
-            <a:r>
-              <a:rPr lang="en-US" altLang="en-US" sz="1200" dirty="0" err="1">
-                <a:latin typeface="Arial" panose="020B0604020202020204" pitchFamily="34" charset="0"/>
-                <a:cs typeface="Arial" panose="020B0604020202020204" pitchFamily="34" charset="0"/>
-              </a:rPr>
-              <a:t>datos</a:t>
-            </a:r>
-            <a:endParaRPr lang="en-US" altLang="en-US" sz="1200" dirty="0">
-              <a:latin typeface="Arial" panose="020B0604020202020204" pitchFamily="34" charset="0"/>
-              <a:cs typeface="Arial" panose="020B0604020202020204" pitchFamily="34" charset="0"/>
-            </a:endParaRPr>
-          </a:p>
-        </p:txBody>
-      </p:sp>
+              <a:t>Athena</a:t>
+            </a:r>
+          </a:p>
+        </p:txBody>
+      </p:sp>
+      <p:grpSp>
+        <p:nvGrpSpPr>
+          <p:cNvPr id="66" name="Grupo 65">
+            <a:extLst>
+              <a:ext uri="{FF2B5EF4-FFF2-40B4-BE49-F238E27FC236}">
+                <a16:creationId xmlns:a16="http://schemas.microsoft.com/office/drawing/2014/main" id="{F5E28F08-3AFA-3AA0-595C-B7B3F6C97BF8}"/>
+              </a:ext>
+            </a:extLst>
+          </p:cNvPr>
+          <p:cNvGrpSpPr/>
+          <p:nvPr/>
+        </p:nvGrpSpPr>
+        <p:grpSpPr>
+          <a:xfrm>
+            <a:off x="7939709" y="2067866"/>
+            <a:ext cx="917289" cy="820886"/>
+            <a:chOff x="2339802" y="3064032"/>
+            <a:chExt cx="917289" cy="777972"/>
+          </a:xfrm>
+        </p:grpSpPr>
+        <p:pic>
+          <p:nvPicPr>
+            <p:cNvPr id="67" name="Graphic 46" descr="Instance instance icon for the Amazon EC2 service.">
+              <a:extLst>
+                <a:ext uri="{FF2B5EF4-FFF2-40B4-BE49-F238E27FC236}">
+                  <a16:creationId xmlns:a16="http://schemas.microsoft.com/office/drawing/2014/main" id="{72F4C889-742C-D20D-8400-AE46BF62C5DF}"/>
+                </a:ext>
+              </a:extLst>
+            </p:cNvPr>
+            <p:cNvPicPr>
+              <a:picLocks noChangeAspect="1"/>
+            </p:cNvPicPr>
+            <p:nvPr/>
+          </p:nvPicPr>
+          <p:blipFill>
+            <a:blip r:embed="rId4">
+              <a:extLst>
+                <a:ext uri="{96DAC541-7B7A-43D3-8B79-37D633B846F1}">
+                  <asvg:svgBlip xmlns:asvg="http://schemas.microsoft.com/office/drawing/2016/SVG/main" r:embed="rId5"/>
+                </a:ext>
+              </a:extLst>
+            </a:blip>
+            <a:stretch>
+              <a:fillRect/>
+            </a:stretch>
+          </p:blipFill>
+          <p:spPr>
+            <a:xfrm>
+              <a:off x="2561271" y="3064032"/>
+              <a:ext cx="457200" cy="457200"/>
+            </a:xfrm>
+            <a:prstGeom prst="rect">
+              <a:avLst/>
+            </a:prstGeom>
+          </p:spPr>
+        </p:pic>
+        <p:sp>
+          <p:nvSpPr>
+            <p:cNvPr id="68" name="CuadroTexto 67">
+              <a:extLst>
+                <a:ext uri="{FF2B5EF4-FFF2-40B4-BE49-F238E27FC236}">
+                  <a16:creationId xmlns:a16="http://schemas.microsoft.com/office/drawing/2014/main" id="{D2CC7AFC-653F-F4FD-2C51-5EA1DAF94B86}"/>
+                </a:ext>
+              </a:extLst>
+            </p:cNvPr>
+            <p:cNvSpPr txBox="1"/>
+            <p:nvPr/>
+          </p:nvSpPr>
+          <p:spPr>
+            <a:xfrm>
+              <a:off x="2339802" y="3491980"/>
+              <a:ext cx="917289" cy="350024"/>
+            </a:xfrm>
+            <a:prstGeom prst="rect">
+              <a:avLst/>
+            </a:prstGeom>
+            <a:noFill/>
+          </p:spPr>
+          <p:txBody>
+            <a:bodyPr wrap="square" rtlCol="0">
+              <a:spAutoFit/>
+            </a:bodyPr>
+            <a:lstStyle/>
+            <a:p>
+              <a:r>
+                <a:rPr lang="es-MX" dirty="0" err="1"/>
+                <a:t>Cowrie</a:t>
+              </a:r>
+              <a:endParaRPr lang="es-MX" dirty="0"/>
+            </a:p>
+          </p:txBody>
+        </p:sp>
+      </p:grpSp>
+      <p:cxnSp>
+        <p:nvCxnSpPr>
+          <p:cNvPr id="70" name="Conector: angular 69">
+            <a:extLst>
+              <a:ext uri="{FF2B5EF4-FFF2-40B4-BE49-F238E27FC236}">
+                <a16:creationId xmlns:a16="http://schemas.microsoft.com/office/drawing/2014/main" id="{65910AD8-C8E2-38F8-D4AA-4B6EE3A58A13}"/>
+              </a:ext>
+            </a:extLst>
+          </p:cNvPr>
+          <p:cNvCxnSpPr>
+            <a:cxnSpLocks/>
+            <a:stCxn id="68" idx="2"/>
+            <a:endCxn id="8" idx="0"/>
+          </p:cNvCxnSpPr>
+          <p:nvPr/>
+        </p:nvCxnSpPr>
+        <p:spPr>
+          <a:xfrm rot="5400000">
+            <a:off x="6847223" y="3191407"/>
+            <a:ext cx="1853787" cy="1248477"/>
+          </a:xfrm>
+          <a:prstGeom prst="bentConnector3">
+            <a:avLst>
+              <a:gd name="adj1" fmla="val 21226"/>
+            </a:avLst>
+          </a:prstGeom>
+          <a:ln>
+            <a:tailEnd type="triangle"/>
+          </a:ln>
+        </p:spPr>
+        <p:style>
+          <a:lnRef idx="2">
+            <a:schemeClr val="accent1"/>
+          </a:lnRef>
+          <a:fillRef idx="0">
+            <a:schemeClr val="accent1"/>
+          </a:fillRef>
+          <a:effectRef idx="1">
+            <a:schemeClr val="accent1"/>
+          </a:effectRef>
+          <a:fontRef idx="minor">
+            <a:schemeClr val="tx1"/>
+          </a:fontRef>
+        </p:style>
+      </p:cxnSp>
+      <p:cxnSp>
+        <p:nvCxnSpPr>
+          <p:cNvPr id="74" name="Conector recto 73">
+            <a:extLst>
+              <a:ext uri="{FF2B5EF4-FFF2-40B4-BE49-F238E27FC236}">
+                <a16:creationId xmlns:a16="http://schemas.microsoft.com/office/drawing/2014/main" id="{3FA31969-5370-1A4A-7A15-9A5F5BB8D290}"/>
+              </a:ext>
+            </a:extLst>
+          </p:cNvPr>
+          <p:cNvCxnSpPr>
+            <a:cxnSpLocks/>
+            <a:stCxn id="7" idx="2"/>
+          </p:cNvCxnSpPr>
+          <p:nvPr/>
+        </p:nvCxnSpPr>
+        <p:spPr>
+          <a:xfrm>
+            <a:off x="7139701" y="2888752"/>
+            <a:ext cx="10176" cy="406212"/>
+          </a:xfrm>
+          <a:prstGeom prst="line">
+            <a:avLst/>
+          </a:prstGeom>
+        </p:spPr>
+        <p:style>
+          <a:lnRef idx="2">
+            <a:schemeClr val="accent1"/>
+          </a:lnRef>
+          <a:fillRef idx="0">
+            <a:schemeClr val="accent1"/>
+          </a:fillRef>
+          <a:effectRef idx="1">
+            <a:schemeClr val="accent1"/>
+          </a:effectRef>
+          <a:fontRef idx="minor">
+            <a:schemeClr val="tx1"/>
+          </a:fontRef>
+        </p:style>
+      </p:cxnSp>
+      <p:cxnSp>
+        <p:nvCxnSpPr>
+          <p:cNvPr id="83" name="Conector recto de flecha 82">
+            <a:extLst>
+              <a:ext uri="{FF2B5EF4-FFF2-40B4-BE49-F238E27FC236}">
+                <a16:creationId xmlns:a16="http://schemas.microsoft.com/office/drawing/2014/main" id="{58C998E3-444E-D861-D2EA-537CC2D0E929}"/>
+              </a:ext>
+            </a:extLst>
+          </p:cNvPr>
+          <p:cNvCxnSpPr>
+            <a:stCxn id="29" idx="3"/>
+            <a:endCxn id="61" idx="1"/>
+          </p:cNvCxnSpPr>
+          <p:nvPr/>
+        </p:nvCxnSpPr>
+        <p:spPr>
+          <a:xfrm>
+            <a:off x="8550279" y="5131291"/>
+            <a:ext cx="1131268" cy="12226"/>
+          </a:xfrm>
+          <a:prstGeom prst="straightConnector1">
+            <a:avLst/>
+          </a:prstGeom>
+          <a:ln>
+            <a:tailEnd type="triangle"/>
+          </a:ln>
+        </p:spPr>
+        <p:style>
+          <a:lnRef idx="2">
+            <a:schemeClr val="accent1"/>
+          </a:lnRef>
+          <a:fillRef idx="0">
+            <a:schemeClr val="accent1"/>
+          </a:fillRef>
+          <a:effectRef idx="1">
+            <a:schemeClr val="accent1"/>
+          </a:effectRef>
+          <a:fontRef idx="minor">
+            <a:schemeClr val="tx1"/>
+          </a:fontRef>
+        </p:style>
+      </p:cxnSp>
       <p:pic>
         <p:nvPicPr>
-          <p:cNvPr id="61" name="Graphic 14" descr="Amazon Athena service icon.">
-            <a:extLst>
-              <a:ext uri="{FF2B5EF4-FFF2-40B4-BE49-F238E27FC236}">
-                <a16:creationId xmlns:a16="http://schemas.microsoft.com/office/drawing/2014/main" id="{24F5C09A-DCCE-30A9-872E-C4D17653E8A2}"/>
+          <p:cNvPr id="84" name="Graphic 10" descr="AWS Lambda service icon.">
+            <a:extLst>
+              <a:ext uri="{FF2B5EF4-FFF2-40B4-BE49-F238E27FC236}">
+                <a16:creationId xmlns:a16="http://schemas.microsoft.com/office/drawing/2014/main" id="{701FAA4F-B9A7-F723-BCCE-10506BAD438F}"/>
               </a:ext>
             </a:extLst>
           </p:cNvPr>
@@ -5953,10 +5809,10 @@
           <p:nvPr/>
         </p:nvPicPr>
         <p:blipFill>
-          <a:blip r:embed="rId22">
+          <a:blip r:embed="rId20">
             <a:extLst>
               <a:ext uri="{96DAC541-7B7A-43D3-8B79-37D633B846F1}">
-                <asvg:svgBlip xmlns:asvg="http://schemas.microsoft.com/office/drawing/2016/SVG/main" r:embed="rId23"/>
+                <asvg:svgBlip xmlns:asvg="http://schemas.microsoft.com/office/drawing/2016/SVG/main" r:embed="rId21"/>
               </a:ext>
             </a:extLst>
           </a:blip>
@@ -5965,8 +5821,8 @@
         </p:blipFill>
         <p:spPr bwMode="auto">
           <a:xfrm>
-            <a:off x="8622957" y="5306606"/>
-            <a:ext cx="440605" cy="440605"/>
+            <a:off x="8125399" y="3640242"/>
+            <a:ext cx="400940" cy="400940"/>
           </a:xfrm>
           <a:prstGeom prst="rect">
             <a:avLst/>
@@ -5996,24 +5852,80 @@
           </a:extLst>
         </p:spPr>
       </p:pic>
-      <p:sp>
-        <p:nvSpPr>
-          <p:cNvPr id="62" name="label5">
-            <a:extLst>
-              <a:ext uri="{FF2B5EF4-FFF2-40B4-BE49-F238E27FC236}">
-                <a16:creationId xmlns:a16="http://schemas.microsoft.com/office/drawing/2014/main" id="{D2442151-A9D9-2CC7-3002-B5E1FB88FC7C}"/>
-              </a:ext>
-            </a:extLst>
-          </p:cNvPr>
-          <p:cNvSpPr txBox="1">
-            <a:spLocks noChangeArrowheads="1"/>
-          </p:cNvSpPr>
+      <p:cxnSp>
+        <p:nvCxnSpPr>
+          <p:cNvPr id="85" name="Conector: angular 84">
+            <a:extLst>
+              <a:ext uri="{FF2B5EF4-FFF2-40B4-BE49-F238E27FC236}">
+                <a16:creationId xmlns:a16="http://schemas.microsoft.com/office/drawing/2014/main" id="{CE423340-5842-F1F4-B9DE-17C2EBB716EF}"/>
+              </a:ext>
+            </a:extLst>
+          </p:cNvPr>
+          <p:cNvCxnSpPr>
+            <a:cxnSpLocks/>
+            <a:stCxn id="8" idx="3"/>
+            <a:endCxn id="84" idx="1"/>
+          </p:cNvCxnSpPr>
           <p:nvPr/>
-        </p:nvSpPr>
+        </p:nvCxnSpPr>
+        <p:spPr>
+          <a:xfrm flipV="1">
+            <a:off x="7378477" y="3840712"/>
+            <a:ext cx="746922" cy="1130427"/>
+          </a:xfrm>
+          <a:prstGeom prst="bentConnector3">
+            <a:avLst>
+              <a:gd name="adj1" fmla="val 50000"/>
+            </a:avLst>
+          </a:prstGeom>
+          <a:ln>
+            <a:tailEnd type="triangle"/>
+          </a:ln>
+        </p:spPr>
+        <p:style>
+          <a:lnRef idx="2">
+            <a:schemeClr val="accent1"/>
+          </a:lnRef>
+          <a:fillRef idx="0">
+            <a:schemeClr val="accent1"/>
+          </a:fillRef>
+          <a:effectRef idx="1">
+            <a:schemeClr val="accent1"/>
+          </a:effectRef>
+          <a:fontRef idx="minor">
+            <a:schemeClr val="tx1"/>
+          </a:fontRef>
+        </p:style>
+      </p:cxnSp>
+      <p:pic>
+        <p:nvPicPr>
+          <p:cNvPr id="89" name="Graphic 17" descr="Amazon CloudWatch service icon.">
+            <a:extLst>
+              <a:ext uri="{FF2B5EF4-FFF2-40B4-BE49-F238E27FC236}">
+                <a16:creationId xmlns:a16="http://schemas.microsoft.com/office/drawing/2014/main" id="{59BA09D9-CBD0-7731-B935-F4805A9FAF1C}"/>
+              </a:ext>
+            </a:extLst>
+          </p:cNvPr>
+          <p:cNvPicPr>
+            <a:picLocks noChangeAspect="1" noChangeArrowheads="1"/>
+          </p:cNvPicPr>
+          <p:nvPr/>
+        </p:nvPicPr>
+        <p:blipFill>
+          <a:blip r:embed="rId22">
+            <a:extLst>
+              <a:ext uri="{96DAC541-7B7A-43D3-8B79-37D633B846F1}">
+                <asvg:svgBlip xmlns:asvg="http://schemas.microsoft.com/office/drawing/2016/SVG/main" r:embed="rId23"/>
+              </a:ext>
+            </a:extLst>
+          </a:blip>
+          <a:srcRect/>
+          <a:stretch/>
+        </p:blipFill>
         <p:spPr bwMode="auto">
           <a:xfrm>
-            <a:off x="6470825" y="3470137"/>
-            <a:ext cx="1238413" cy="276999"/>
+            <a:off x="9725225" y="3620222"/>
+            <a:ext cx="537144" cy="537144"/>
           </a:xfrm>
           <a:prstGeom prst="rect">
             <a:avLst/>
@@ -6042,295 +5954,7 @@
             </a:ext>
           </a:extLst>
         </p:spPr>
-        <p:txBody>
-          <a:bodyPr wrap="square">
-            <a:spAutoFit/>
-          </a:bodyPr>
-          <a:lstStyle>
-            <a:lvl1pPr>
-              <a:defRPr>
-                <a:solidFill>
-                  <a:schemeClr val="tx1"/>
-                </a:solidFill>
-                <a:latin typeface="Calibri" panose="020F0502020204030204" pitchFamily="34" charset="0"/>
-              </a:defRPr>
-            </a:lvl1pPr>
-            <a:lvl2pPr marL="742950" indent="-285750">
-              <a:defRPr>
-                <a:solidFill>
-                  <a:schemeClr val="tx1"/>
-                </a:solidFill>
-                <a:latin typeface="Calibri" panose="020F0502020204030204" pitchFamily="34" charset="0"/>
-              </a:defRPr>
-            </a:lvl2pPr>
-            <a:lvl3pPr marL="1143000" indent="-228600">
-              <a:defRPr>
-                <a:solidFill>
-                  <a:schemeClr val="tx1"/>
-                </a:solidFill>
-                <a:latin typeface="Calibri" panose="020F0502020204030204" pitchFamily="34" charset="0"/>
-              </a:defRPr>
-            </a:lvl3pPr>
-            <a:lvl4pPr marL="1600200" indent="-228600">
-              <a:defRPr>
-                <a:solidFill>
-                  <a:schemeClr val="tx1"/>
-                </a:solidFill>
-                <a:latin typeface="Calibri" panose="020F0502020204030204" pitchFamily="34" charset="0"/>
-              </a:defRPr>
-            </a:lvl4pPr>
-            <a:lvl5pPr marL="2057400" indent="-228600">
-              <a:defRPr>
-                <a:solidFill>
-                  <a:schemeClr val="tx1"/>
-                </a:solidFill>
-                <a:latin typeface="Calibri" panose="020F0502020204030204" pitchFamily="34" charset="0"/>
-              </a:defRPr>
-            </a:lvl5pPr>
-            <a:lvl6pPr marL="2514600" indent="-228600" eaLnBrk="0" fontAlgn="base" hangingPunct="0">
-              <a:spcBef>
-                <a:spcPct val="0"/>
-              </a:spcBef>
-              <a:spcAft>
-                <a:spcPct val="0"/>
-              </a:spcAft>
-              <a:defRPr>
-                <a:solidFill>
-                  <a:schemeClr val="tx1"/>
-                </a:solidFill>
-                <a:latin typeface="Calibri" panose="020F0502020204030204" pitchFamily="34" charset="0"/>
-              </a:defRPr>
-            </a:lvl6pPr>
-            <a:lvl7pPr marL="2971800" indent="-228600" eaLnBrk="0" fontAlgn="base" hangingPunct="0">
-              <a:spcBef>
-                <a:spcPct val="0"/>
-              </a:spcBef>
-              <a:spcAft>
-                <a:spcPct val="0"/>
-              </a:spcAft>
-              <a:defRPr>
-                <a:solidFill>
-                  <a:schemeClr val="tx1"/>
-                </a:solidFill>
-                <a:latin typeface="Calibri" panose="020F0502020204030204" pitchFamily="34" charset="0"/>
-              </a:defRPr>
-            </a:lvl7pPr>
-            <a:lvl8pPr marL="3429000" indent="-228600" eaLnBrk="0" fontAlgn="base" hangingPunct="0">
-              <a:spcBef>
-                <a:spcPct val="0"/>
-              </a:spcBef>
-              <a:spcAft>
-                <a:spcPct val="0"/>
-              </a:spcAft>
-              <a:defRPr>
-                <a:solidFill>
-                  <a:schemeClr val="tx1"/>
-                </a:solidFill>
-                <a:latin typeface="Calibri" panose="020F0502020204030204" pitchFamily="34" charset="0"/>
-              </a:defRPr>
-            </a:lvl8pPr>
-            <a:lvl9pPr marL="3886200" indent="-228600" eaLnBrk="0" fontAlgn="base" hangingPunct="0">
-              <a:spcBef>
-                <a:spcPct val="0"/>
-              </a:spcBef>
-              <a:spcAft>
-                <a:spcPct val="0"/>
-              </a:spcAft>
-              <a:defRPr>
-                <a:solidFill>
-                  <a:schemeClr val="tx1"/>
-                </a:solidFill>
-                <a:latin typeface="Calibri" panose="020F0502020204030204" pitchFamily="34" charset="0"/>
-              </a:defRPr>
-            </a:lvl9pPr>
-          </a:lstStyle>
-          <a:p>
-            <a:pPr algn="ctr" eaLnBrk="1" hangingPunct="1"/>
-            <a:r>
-              <a:rPr lang="en-US" altLang="en-US" sz="1200" dirty="0">
-                <a:latin typeface="Arial" panose="020B0604020202020204" pitchFamily="34" charset="0"/>
-                <a:cs typeface="Arial" panose="020B0604020202020204" pitchFamily="34" charset="0"/>
-              </a:rPr>
-              <a:t>Carga </a:t>
-            </a:r>
-            <a:r>
-              <a:rPr lang="en-US" altLang="en-US" sz="1200" dirty="0" err="1">
-                <a:latin typeface="Arial" panose="020B0604020202020204" pitchFamily="34" charset="0"/>
-                <a:cs typeface="Arial" panose="020B0604020202020204" pitchFamily="34" charset="0"/>
-              </a:rPr>
-              <a:t>datos</a:t>
-            </a:r>
-            <a:endParaRPr lang="en-US" altLang="en-US" sz="1200" dirty="0">
-              <a:latin typeface="Arial" panose="020B0604020202020204" pitchFamily="34" charset="0"/>
-              <a:cs typeface="Arial" panose="020B0604020202020204" pitchFamily="34" charset="0"/>
-            </a:endParaRPr>
-          </a:p>
-        </p:txBody>
-      </p:sp>
-      <p:sp>
-        <p:nvSpPr>
-          <p:cNvPr id="63" name="label5">
-            <a:extLst>
-              <a:ext uri="{FF2B5EF4-FFF2-40B4-BE49-F238E27FC236}">
-                <a16:creationId xmlns:a16="http://schemas.microsoft.com/office/drawing/2014/main" id="{33049AE0-0CDF-0569-8F62-BE3421A974E8}"/>
-              </a:ext>
-            </a:extLst>
-          </p:cNvPr>
-          <p:cNvSpPr txBox="1">
-            <a:spLocks noChangeArrowheads="1"/>
-          </p:cNvSpPr>
-          <p:nvPr/>
-        </p:nvSpPr>
-        <p:spPr bwMode="auto">
-          <a:xfrm>
-            <a:off x="8224052" y="5751855"/>
-            <a:ext cx="1238413" cy="276999"/>
-          </a:xfrm>
-          <a:prstGeom prst="rect">
-            <a:avLst/>
-          </a:prstGeom>
-          <a:noFill/>
-          <a:ln>
-            <a:noFill/>
-          </a:ln>
-          <a:extLst>
-            <a:ext uri="{909E8E84-426E-40DD-AFC4-6F175D3DCCD1}">
-              <a14:hiddenFill xmlns:a14="http://schemas.microsoft.com/office/drawing/2010/main">
-                <a:solidFill>
-                  <a:srgbClr val="FFFFFF"/>
-                </a:solidFill>
-              </a14:hiddenFill>
-            </a:ext>
-            <a:ext uri="{91240B29-F687-4F45-9708-019B960494DF}">
-              <a14:hiddenLine xmlns:a14="http://schemas.microsoft.com/office/drawing/2010/main" w="9525">
-                <a:solidFill>
-                  <a:srgbClr val="000000"/>
-                </a:solidFill>
-                <a:miter lim="800000"/>
-                <a:headEnd/>
-                <a:tailEnd/>
-              </a14:hiddenLine>
-            </a:ext>
-          </a:extLst>
-        </p:spPr>
-        <p:txBody>
-          <a:bodyPr wrap="square">
-            <a:spAutoFit/>
-          </a:bodyPr>
-          <a:lstStyle>
-            <a:lvl1pPr>
-              <a:defRPr>
-                <a:solidFill>
-                  <a:schemeClr val="tx1"/>
-                </a:solidFill>
-                <a:latin typeface="Calibri" panose="020F0502020204030204" pitchFamily="34" charset="0"/>
-              </a:defRPr>
-            </a:lvl1pPr>
-            <a:lvl2pPr marL="742950" indent="-285750">
-              <a:defRPr>
-                <a:solidFill>
-                  <a:schemeClr val="tx1"/>
-                </a:solidFill>
-                <a:latin typeface="Calibri" panose="020F0502020204030204" pitchFamily="34" charset="0"/>
-              </a:defRPr>
-            </a:lvl2pPr>
-            <a:lvl3pPr marL="1143000" indent="-228600">
-              <a:defRPr>
-                <a:solidFill>
-                  <a:schemeClr val="tx1"/>
-                </a:solidFill>
-                <a:latin typeface="Calibri" panose="020F0502020204030204" pitchFamily="34" charset="0"/>
-              </a:defRPr>
-            </a:lvl3pPr>
-            <a:lvl4pPr marL="1600200" indent="-228600">
-              <a:defRPr>
-                <a:solidFill>
-                  <a:schemeClr val="tx1"/>
-                </a:solidFill>
-                <a:latin typeface="Calibri" panose="020F0502020204030204" pitchFamily="34" charset="0"/>
-              </a:defRPr>
-            </a:lvl4pPr>
-            <a:lvl5pPr marL="2057400" indent="-228600">
-              <a:defRPr>
-                <a:solidFill>
-                  <a:schemeClr val="tx1"/>
-                </a:solidFill>
-                <a:latin typeface="Calibri" panose="020F0502020204030204" pitchFamily="34" charset="0"/>
-              </a:defRPr>
-            </a:lvl5pPr>
-            <a:lvl6pPr marL="2514600" indent="-228600" eaLnBrk="0" fontAlgn="base" hangingPunct="0">
-              <a:spcBef>
-                <a:spcPct val="0"/>
-              </a:spcBef>
-              <a:spcAft>
-                <a:spcPct val="0"/>
-              </a:spcAft>
-              <a:defRPr>
-                <a:solidFill>
-                  <a:schemeClr val="tx1"/>
-                </a:solidFill>
-                <a:latin typeface="Calibri" panose="020F0502020204030204" pitchFamily="34" charset="0"/>
-              </a:defRPr>
-            </a:lvl6pPr>
-            <a:lvl7pPr marL="2971800" indent="-228600" eaLnBrk="0" fontAlgn="base" hangingPunct="0">
-              <a:spcBef>
-                <a:spcPct val="0"/>
-              </a:spcBef>
-              <a:spcAft>
-                <a:spcPct val="0"/>
-              </a:spcAft>
-              <a:defRPr>
-                <a:solidFill>
-                  <a:schemeClr val="tx1"/>
-                </a:solidFill>
-                <a:latin typeface="Calibri" panose="020F0502020204030204" pitchFamily="34" charset="0"/>
-              </a:defRPr>
-            </a:lvl7pPr>
-            <a:lvl8pPr marL="3429000" indent="-228600" eaLnBrk="0" fontAlgn="base" hangingPunct="0">
-              <a:spcBef>
-                <a:spcPct val="0"/>
-              </a:spcBef>
-              <a:spcAft>
-                <a:spcPct val="0"/>
-              </a:spcAft>
-              <a:defRPr>
-                <a:solidFill>
-                  <a:schemeClr val="tx1"/>
-                </a:solidFill>
-                <a:latin typeface="Calibri" panose="020F0502020204030204" pitchFamily="34" charset="0"/>
-              </a:defRPr>
-            </a:lvl8pPr>
-            <a:lvl9pPr marL="3886200" indent="-228600" eaLnBrk="0" fontAlgn="base" hangingPunct="0">
-              <a:spcBef>
-                <a:spcPct val="0"/>
-              </a:spcBef>
-              <a:spcAft>
-                <a:spcPct val="0"/>
-              </a:spcAft>
-              <a:defRPr>
-                <a:solidFill>
-                  <a:schemeClr val="tx1"/>
-                </a:solidFill>
-                <a:latin typeface="Calibri" panose="020F0502020204030204" pitchFamily="34" charset="0"/>
-              </a:defRPr>
-            </a:lvl9pPr>
-          </a:lstStyle>
-          <a:p>
-            <a:pPr algn="ctr" eaLnBrk="1" hangingPunct="1"/>
-            <a:r>
-              <a:rPr lang="en-US" altLang="en-US" sz="1200">
-                <a:latin typeface="Arial" panose="020B0604020202020204" pitchFamily="34" charset="0"/>
-                <a:cs typeface="Arial" panose="020B0604020202020204" pitchFamily="34" charset="0"/>
-              </a:rPr>
-              <a:t>Athena</a:t>
-            </a:r>
-            <a:endParaRPr lang="en-US" altLang="en-US" sz="1200" dirty="0">
-              <a:latin typeface="Arial" panose="020B0604020202020204" pitchFamily="34" charset="0"/>
-              <a:cs typeface="Arial" panose="020B0604020202020204" pitchFamily="34" charset="0"/>
-            </a:endParaRPr>
-          </a:p>
-        </p:txBody>
-      </p:sp>
+      </p:pic>
     </p:spTree>
     <p:extLst>
       <p:ext uri="{BB962C8B-B14F-4D97-AF65-F5344CB8AC3E}">

</xml_diff>